<commit_message>
wip/intro draft almost done
</commit_message>
<xml_diff>
--- a/Chapter_1/figures/demon_hierarchy.pptx
+++ b/Chapter_1/figures/demon_hierarchy.pptx
@@ -2,18 +2,18 @@
 <file path=ppt/presentation.xml><?xml version="1.0" encoding="utf-8"?>
 <p:presentation xmlns:a="http://schemas.openxmlformats.org/drawingml/2006/main" xmlns:r="http://schemas.openxmlformats.org/officeDocument/2006/relationships" xmlns:p="http://schemas.openxmlformats.org/presentationml/2006/main" saveSubsetFonts="1" autoCompressPictures="0">
   <p:sldMasterIdLst>
-    <p:sldMasterId id="2147483648" r:id="rId1"/>
+    <p:sldMasterId id="2147483708" r:id="rId1"/>
   </p:sldMasterIdLst>
   <p:sldIdLst>
     <p:sldId id="256" r:id="rId2"/>
   </p:sldIdLst>
-  <p:sldSz cx="12192000" cy="6858000"/>
+  <p:sldSz cx="4092575" cy="4086225"/>
   <p:notesSz cx="6858000" cy="9144000"/>
   <p:defaultTextStyle>
     <a:defPPr>
       <a:defRPr lang="en-US"/>
     </a:defPPr>
-    <a:lvl1pPr marL="0" algn="l" defTabSz="914400" rtl="0" eaLnBrk="1" latinLnBrk="0" hangingPunct="1">
+    <a:lvl1pPr marL="0" algn="l" defTabSz="457200" rtl="0" eaLnBrk="1" latinLnBrk="0" hangingPunct="1">
       <a:defRPr sz="1800" kern="1200">
         <a:solidFill>
           <a:schemeClr val="tx1"/>
@@ -23,7 +23,7 @@
         <a:cs typeface="+mn-cs"/>
       </a:defRPr>
     </a:lvl1pPr>
-    <a:lvl2pPr marL="457200" algn="l" defTabSz="914400" rtl="0" eaLnBrk="1" latinLnBrk="0" hangingPunct="1">
+    <a:lvl2pPr marL="457200" algn="l" defTabSz="457200" rtl="0" eaLnBrk="1" latinLnBrk="0" hangingPunct="1">
       <a:defRPr sz="1800" kern="1200">
         <a:solidFill>
           <a:schemeClr val="tx1"/>
@@ -33,7 +33,7 @@
         <a:cs typeface="+mn-cs"/>
       </a:defRPr>
     </a:lvl2pPr>
-    <a:lvl3pPr marL="914400" algn="l" defTabSz="914400" rtl="0" eaLnBrk="1" latinLnBrk="0" hangingPunct="1">
+    <a:lvl3pPr marL="914400" algn="l" defTabSz="457200" rtl="0" eaLnBrk="1" latinLnBrk="0" hangingPunct="1">
       <a:defRPr sz="1800" kern="1200">
         <a:solidFill>
           <a:schemeClr val="tx1"/>
@@ -43,7 +43,7 @@
         <a:cs typeface="+mn-cs"/>
       </a:defRPr>
     </a:lvl3pPr>
-    <a:lvl4pPr marL="1371600" algn="l" defTabSz="914400" rtl="0" eaLnBrk="1" latinLnBrk="0" hangingPunct="1">
+    <a:lvl4pPr marL="1371600" algn="l" defTabSz="457200" rtl="0" eaLnBrk="1" latinLnBrk="0" hangingPunct="1">
       <a:defRPr sz="1800" kern="1200">
         <a:solidFill>
           <a:schemeClr val="tx1"/>
@@ -53,7 +53,7 @@
         <a:cs typeface="+mn-cs"/>
       </a:defRPr>
     </a:lvl4pPr>
-    <a:lvl5pPr marL="1828800" algn="l" defTabSz="914400" rtl="0" eaLnBrk="1" latinLnBrk="0" hangingPunct="1">
+    <a:lvl5pPr marL="1828800" algn="l" defTabSz="457200" rtl="0" eaLnBrk="1" latinLnBrk="0" hangingPunct="1">
       <a:defRPr sz="1800" kern="1200">
         <a:solidFill>
           <a:schemeClr val="tx1"/>
@@ -63,7 +63,7 @@
         <a:cs typeface="+mn-cs"/>
       </a:defRPr>
     </a:lvl5pPr>
-    <a:lvl6pPr marL="2286000" algn="l" defTabSz="914400" rtl="0" eaLnBrk="1" latinLnBrk="0" hangingPunct="1">
+    <a:lvl6pPr marL="2286000" algn="l" defTabSz="457200" rtl="0" eaLnBrk="1" latinLnBrk="0" hangingPunct="1">
       <a:defRPr sz="1800" kern="1200">
         <a:solidFill>
           <a:schemeClr val="tx1"/>
@@ -73,7 +73,7 @@
         <a:cs typeface="+mn-cs"/>
       </a:defRPr>
     </a:lvl6pPr>
-    <a:lvl7pPr marL="2743200" algn="l" defTabSz="914400" rtl="0" eaLnBrk="1" latinLnBrk="0" hangingPunct="1">
+    <a:lvl7pPr marL="2743200" algn="l" defTabSz="457200" rtl="0" eaLnBrk="1" latinLnBrk="0" hangingPunct="1">
       <a:defRPr sz="1800" kern="1200">
         <a:solidFill>
           <a:schemeClr val="tx1"/>
@@ -83,7 +83,7 @@
         <a:cs typeface="+mn-cs"/>
       </a:defRPr>
     </a:lvl7pPr>
-    <a:lvl8pPr marL="3200400" algn="l" defTabSz="914400" rtl="0" eaLnBrk="1" latinLnBrk="0" hangingPunct="1">
+    <a:lvl8pPr marL="3200400" algn="l" defTabSz="457200" rtl="0" eaLnBrk="1" latinLnBrk="0" hangingPunct="1">
       <a:defRPr sz="1800" kern="1200">
         <a:solidFill>
           <a:schemeClr val="tx1"/>
@@ -93,7 +93,7 @@
         <a:cs typeface="+mn-cs"/>
       </a:defRPr>
     </a:lvl8pPr>
-    <a:lvl9pPr marL="3657600" algn="l" defTabSz="914400" rtl="0" eaLnBrk="1" latinLnBrk="0" hangingPunct="1">
+    <a:lvl9pPr marL="3657600" algn="l" defTabSz="457200" rtl="0" eaLnBrk="1" latinLnBrk="0" hangingPunct="1">
       <a:defRPr sz="1800" kern="1200">
         <a:solidFill>
           <a:schemeClr val="tx1"/>
@@ -104,6 +104,11 @@
       </a:defRPr>
     </a:lvl9pPr>
   </p:defaultTextStyle>
+  <p:extLst>
+    <p:ext uri="{EFAFB233-063F-42B5-8137-9DF3F51BA10A}">
+      <p15:sldGuideLst xmlns:p15="http://schemas.microsoft.com/office/powerpoint/2012/main"/>
+    </p:ext>
+  </p:extLst>
 </p:presentation>
 </file>
 
@@ -126,13 +131,7 @@
       </p:grpSpPr>
       <p:sp>
         <p:nvSpPr>
-          <p:cNvPr id="2" name="Title 1">
-            <a:extLst>
-              <a:ext uri="{FF2B5EF4-FFF2-40B4-BE49-F238E27FC236}">
-                <a16:creationId xmlns:a16="http://schemas.microsoft.com/office/drawing/2014/main" id="{105A6A87-CC8A-CDCE-45F9-9C798A009A51}"/>
-              </a:ext>
-            </a:extLst>
-          </p:cNvPr>
+          <p:cNvPr id="2" name="Title 1"/>
           <p:cNvSpPr>
             <a:spLocks noGrp="1"/>
           </p:cNvSpPr>
@@ -142,15 +141,15 @@
         </p:nvSpPr>
         <p:spPr>
           <a:xfrm>
-            <a:off x="1524000" y="1122363"/>
-            <a:ext cx="9144000" cy="2387600"/>
+            <a:off x="306943" y="668741"/>
+            <a:ext cx="3478689" cy="1422612"/>
           </a:xfrm>
         </p:spPr>
         <p:txBody>
           <a:bodyPr anchor="b"/>
           <a:lstStyle>
             <a:lvl1pPr algn="ctr">
-              <a:defRPr sz="6000"/>
+              <a:defRPr sz="2686"/>
             </a:lvl1pPr>
           </a:lstStyle>
           <a:p>
@@ -158,19 +157,13 @@
               <a:rPr lang="en-GB"/>
               <a:t>Click to edit Master title style</a:t>
             </a:r>
-            <a:endParaRPr lang="en-US"/>
-          </a:p>
-        </p:txBody>
-      </p:sp>
-      <p:sp>
-        <p:nvSpPr>
-          <p:cNvPr id="3" name="Subtitle 2">
-            <a:extLst>
-              <a:ext uri="{FF2B5EF4-FFF2-40B4-BE49-F238E27FC236}">
-                <a16:creationId xmlns:a16="http://schemas.microsoft.com/office/drawing/2014/main" id="{405A0672-CC67-0048-9AAF-E0CE8BBE3185}"/>
-              </a:ext>
-            </a:extLst>
-          </p:cNvPr>
+            <a:endParaRPr lang="en-US" dirty="0"/>
+          </a:p>
+        </p:txBody>
+      </p:sp>
+      <p:sp>
+        <p:nvSpPr>
+          <p:cNvPr id="3" name="Subtitle 2"/>
           <p:cNvSpPr>
             <a:spLocks noGrp="1"/>
           </p:cNvSpPr>
@@ -180,8 +173,8 @@
         </p:nvSpPr>
         <p:spPr>
           <a:xfrm>
-            <a:off x="1524000" y="3602038"/>
-            <a:ext cx="9144000" cy="1655762"/>
+            <a:off x="511572" y="2146214"/>
+            <a:ext cx="3069431" cy="986558"/>
           </a:xfrm>
         </p:spPr>
         <p:txBody>
@@ -189,39 +182,39 @@
           <a:lstStyle>
             <a:lvl1pPr marL="0" indent="0" algn="ctr">
               <a:buNone/>
-              <a:defRPr sz="2400"/>
+              <a:defRPr sz="1074"/>
             </a:lvl1pPr>
-            <a:lvl2pPr marL="457200" indent="0" algn="ctr">
-              <a:buNone/>
-              <a:defRPr sz="2000"/>
+            <a:lvl2pPr marL="204643" indent="0" algn="ctr">
+              <a:buNone/>
+              <a:defRPr sz="895"/>
             </a:lvl2pPr>
-            <a:lvl3pPr marL="914400" indent="0" algn="ctr">
-              <a:buNone/>
-              <a:defRPr sz="1800"/>
+            <a:lvl3pPr marL="409285" indent="0" algn="ctr">
+              <a:buNone/>
+              <a:defRPr sz="806"/>
             </a:lvl3pPr>
-            <a:lvl4pPr marL="1371600" indent="0" algn="ctr">
-              <a:buNone/>
-              <a:defRPr sz="1600"/>
+            <a:lvl4pPr marL="613928" indent="0" algn="ctr">
+              <a:buNone/>
+              <a:defRPr sz="716"/>
             </a:lvl4pPr>
-            <a:lvl5pPr marL="1828800" indent="0" algn="ctr">
-              <a:buNone/>
-              <a:defRPr sz="1600"/>
+            <a:lvl5pPr marL="818571" indent="0" algn="ctr">
+              <a:buNone/>
+              <a:defRPr sz="716"/>
             </a:lvl5pPr>
-            <a:lvl6pPr marL="2286000" indent="0" algn="ctr">
-              <a:buNone/>
-              <a:defRPr sz="1600"/>
+            <a:lvl6pPr marL="1023214" indent="0" algn="ctr">
+              <a:buNone/>
+              <a:defRPr sz="716"/>
             </a:lvl6pPr>
-            <a:lvl7pPr marL="2743200" indent="0" algn="ctr">
-              <a:buNone/>
-              <a:defRPr sz="1600"/>
+            <a:lvl7pPr marL="1227856" indent="0" algn="ctr">
+              <a:buNone/>
+              <a:defRPr sz="716"/>
             </a:lvl7pPr>
-            <a:lvl8pPr marL="3200400" indent="0" algn="ctr">
-              <a:buNone/>
-              <a:defRPr sz="1600"/>
+            <a:lvl8pPr marL="1432499" indent="0" algn="ctr">
+              <a:buNone/>
+              <a:defRPr sz="716"/>
             </a:lvl8pPr>
-            <a:lvl9pPr marL="3657600" indent="0" algn="ctr">
-              <a:buNone/>
-              <a:defRPr sz="1600"/>
+            <a:lvl9pPr marL="1637142" indent="0" algn="ctr">
+              <a:buNone/>
+              <a:defRPr sz="716"/>
             </a:lvl9pPr>
           </a:lstStyle>
           <a:p>
@@ -229,19 +222,13 @@
               <a:rPr lang="en-GB"/>
               <a:t>Click to edit Master subtitle style</a:t>
             </a:r>
-            <a:endParaRPr lang="en-US"/>
-          </a:p>
-        </p:txBody>
-      </p:sp>
-      <p:sp>
-        <p:nvSpPr>
-          <p:cNvPr id="4" name="Date Placeholder 3">
-            <a:extLst>
-              <a:ext uri="{FF2B5EF4-FFF2-40B4-BE49-F238E27FC236}">
-                <a16:creationId xmlns:a16="http://schemas.microsoft.com/office/drawing/2014/main" id="{F07CC1FC-F056-A947-CD80-AF1B3BC71BBF}"/>
-              </a:ext>
-            </a:extLst>
-          </p:cNvPr>
+            <a:endParaRPr lang="en-US" dirty="0"/>
+          </a:p>
+        </p:txBody>
+      </p:sp>
+      <p:sp>
+        <p:nvSpPr>
+          <p:cNvPr id="4" name="Date Placeholder 3"/>
           <p:cNvSpPr>
             <a:spLocks noGrp="1"/>
           </p:cNvSpPr>
@@ -256,7 +243,7 @@
           <a:p>
             <a:fld id="{3F4ECB22-EC8D-AE46-A7E6-96BE5F73D66D}" type="datetimeFigureOut">
               <a:rPr lang="en-US" smtClean="0"/>
-              <a:t>2/11/24</a:t>
+              <a:t>2/19/24</a:t>
             </a:fld>
             <a:endParaRPr lang="en-US"/>
           </a:p>
@@ -264,13 +251,7 @@
       </p:sp>
       <p:sp>
         <p:nvSpPr>
-          <p:cNvPr id="5" name="Footer Placeholder 4">
-            <a:extLst>
-              <a:ext uri="{FF2B5EF4-FFF2-40B4-BE49-F238E27FC236}">
-                <a16:creationId xmlns:a16="http://schemas.microsoft.com/office/drawing/2014/main" id="{16F41F09-D146-BE1D-EFF9-C1E06C805D3F}"/>
-              </a:ext>
-            </a:extLst>
-          </p:cNvPr>
+          <p:cNvPr id="5" name="Footer Placeholder 4"/>
           <p:cNvSpPr>
             <a:spLocks noGrp="1"/>
           </p:cNvSpPr>
@@ -289,13 +270,7 @@
       </p:sp>
       <p:sp>
         <p:nvSpPr>
-          <p:cNvPr id="6" name="Slide Number Placeholder 5">
-            <a:extLst>
-              <a:ext uri="{FF2B5EF4-FFF2-40B4-BE49-F238E27FC236}">
-                <a16:creationId xmlns:a16="http://schemas.microsoft.com/office/drawing/2014/main" id="{AC39661E-382F-F58C-8AF0-60C6EC0512BB}"/>
-              </a:ext>
-            </a:extLst>
-          </p:cNvPr>
+          <p:cNvPr id="6" name="Slide Number Placeholder 5"/>
           <p:cNvSpPr>
             <a:spLocks noGrp="1"/>
           </p:cNvSpPr>
@@ -319,7 +294,7 @@
     </p:spTree>
     <p:extLst>
       <p:ext uri="{BB962C8B-B14F-4D97-AF65-F5344CB8AC3E}">
-        <p14:creationId xmlns:p14="http://schemas.microsoft.com/office/powerpoint/2010/main" val="1112018023"/>
+        <p14:creationId xmlns:p14="http://schemas.microsoft.com/office/powerpoint/2010/main" val="765767355"/>
       </p:ext>
     </p:extLst>
   </p:cSld>
@@ -348,13 +323,7 @@
       </p:grpSpPr>
       <p:sp>
         <p:nvSpPr>
-          <p:cNvPr id="2" name="Title 1">
-            <a:extLst>
-              <a:ext uri="{FF2B5EF4-FFF2-40B4-BE49-F238E27FC236}">
-                <a16:creationId xmlns:a16="http://schemas.microsoft.com/office/drawing/2014/main" id="{92DABC15-1826-A6F1-17D2-DF55D14DE24D}"/>
-              </a:ext>
-            </a:extLst>
-          </p:cNvPr>
+          <p:cNvPr id="2" name="Title 1"/>
           <p:cNvSpPr>
             <a:spLocks noGrp="1"/>
           </p:cNvSpPr>
@@ -371,19 +340,13 @@
               <a:rPr lang="en-GB"/>
               <a:t>Click to edit Master title style</a:t>
             </a:r>
-            <a:endParaRPr lang="en-US"/>
-          </a:p>
-        </p:txBody>
-      </p:sp>
-      <p:sp>
-        <p:nvSpPr>
-          <p:cNvPr id="3" name="Vertical Text Placeholder 2">
-            <a:extLst>
-              <a:ext uri="{FF2B5EF4-FFF2-40B4-BE49-F238E27FC236}">
-                <a16:creationId xmlns:a16="http://schemas.microsoft.com/office/drawing/2014/main" id="{4853D8D8-0315-12E1-58A3-34F8102A1231}"/>
-              </a:ext>
-            </a:extLst>
-          </p:cNvPr>
+            <a:endParaRPr lang="en-US" dirty="0"/>
+          </a:p>
+        </p:txBody>
+      </p:sp>
+      <p:sp>
+        <p:nvSpPr>
+          <p:cNvPr id="3" name="Vertical Text Placeholder 2"/>
           <p:cNvSpPr>
             <a:spLocks noGrp="1"/>
           </p:cNvSpPr>
@@ -429,19 +392,13 @@
               <a:rPr lang="en-GB"/>
               <a:t>Fifth level</a:t>
             </a:r>
-            <a:endParaRPr lang="en-US"/>
-          </a:p>
-        </p:txBody>
-      </p:sp>
-      <p:sp>
-        <p:nvSpPr>
-          <p:cNvPr id="4" name="Date Placeholder 3">
-            <a:extLst>
-              <a:ext uri="{FF2B5EF4-FFF2-40B4-BE49-F238E27FC236}">
-                <a16:creationId xmlns:a16="http://schemas.microsoft.com/office/drawing/2014/main" id="{7BC52ABD-B9E4-6AEB-87FA-CF11C27C9ED9}"/>
-              </a:ext>
-            </a:extLst>
-          </p:cNvPr>
+            <a:endParaRPr lang="en-US" dirty="0"/>
+          </a:p>
+        </p:txBody>
+      </p:sp>
+      <p:sp>
+        <p:nvSpPr>
+          <p:cNvPr id="4" name="Date Placeholder 3"/>
           <p:cNvSpPr>
             <a:spLocks noGrp="1"/>
           </p:cNvSpPr>
@@ -456,7 +413,7 @@
           <a:p>
             <a:fld id="{3F4ECB22-EC8D-AE46-A7E6-96BE5F73D66D}" type="datetimeFigureOut">
               <a:rPr lang="en-US" smtClean="0"/>
-              <a:t>2/11/24</a:t>
+              <a:t>2/19/24</a:t>
             </a:fld>
             <a:endParaRPr lang="en-US"/>
           </a:p>
@@ -464,13 +421,7 @@
       </p:sp>
       <p:sp>
         <p:nvSpPr>
-          <p:cNvPr id="5" name="Footer Placeholder 4">
-            <a:extLst>
-              <a:ext uri="{FF2B5EF4-FFF2-40B4-BE49-F238E27FC236}">
-                <a16:creationId xmlns:a16="http://schemas.microsoft.com/office/drawing/2014/main" id="{2331BC0D-D038-7AB5-E336-56F44E925BD0}"/>
-              </a:ext>
-            </a:extLst>
-          </p:cNvPr>
+          <p:cNvPr id="5" name="Footer Placeholder 4"/>
           <p:cNvSpPr>
             <a:spLocks noGrp="1"/>
           </p:cNvSpPr>
@@ -489,13 +440,7 @@
       </p:sp>
       <p:sp>
         <p:nvSpPr>
-          <p:cNvPr id="6" name="Slide Number Placeholder 5">
-            <a:extLst>
-              <a:ext uri="{FF2B5EF4-FFF2-40B4-BE49-F238E27FC236}">
-                <a16:creationId xmlns:a16="http://schemas.microsoft.com/office/drawing/2014/main" id="{418A5BFE-C574-6212-E2C3-FA482E0E22FA}"/>
-              </a:ext>
-            </a:extLst>
-          </p:cNvPr>
+          <p:cNvPr id="6" name="Slide Number Placeholder 5"/>
           <p:cNvSpPr>
             <a:spLocks noGrp="1"/>
           </p:cNvSpPr>
@@ -519,7 +464,7 @@
     </p:spTree>
     <p:extLst>
       <p:ext uri="{BB962C8B-B14F-4D97-AF65-F5344CB8AC3E}">
-        <p14:creationId xmlns:p14="http://schemas.microsoft.com/office/powerpoint/2010/main" val="2743201047"/>
+        <p14:creationId xmlns:p14="http://schemas.microsoft.com/office/powerpoint/2010/main" val="1451257799"/>
       </p:ext>
     </p:extLst>
   </p:cSld>
@@ -548,13 +493,7 @@
       </p:grpSpPr>
       <p:sp>
         <p:nvSpPr>
-          <p:cNvPr id="2" name="Vertical Title 1">
-            <a:extLst>
-              <a:ext uri="{FF2B5EF4-FFF2-40B4-BE49-F238E27FC236}">
-                <a16:creationId xmlns:a16="http://schemas.microsoft.com/office/drawing/2014/main" id="{5B472280-E418-AF38-B83A-8325BD882A1C}"/>
-              </a:ext>
-            </a:extLst>
-          </p:cNvPr>
+          <p:cNvPr id="2" name="Vertical Title 1"/>
           <p:cNvSpPr>
             <a:spLocks noGrp="1"/>
           </p:cNvSpPr>
@@ -564,8 +503,8 @@
         </p:nvSpPr>
         <p:spPr>
           <a:xfrm>
-            <a:off x="8724900" y="365125"/>
-            <a:ext cx="2628900" cy="5811838"/>
+            <a:off x="2928749" y="217554"/>
+            <a:ext cx="882461" cy="3462887"/>
           </a:xfrm>
         </p:spPr>
         <p:txBody>
@@ -576,19 +515,13 @@
               <a:rPr lang="en-GB"/>
               <a:t>Click to edit Master title style</a:t>
             </a:r>
-            <a:endParaRPr lang="en-US"/>
-          </a:p>
-        </p:txBody>
-      </p:sp>
-      <p:sp>
-        <p:nvSpPr>
-          <p:cNvPr id="3" name="Vertical Text Placeholder 2">
-            <a:extLst>
-              <a:ext uri="{FF2B5EF4-FFF2-40B4-BE49-F238E27FC236}">
-                <a16:creationId xmlns:a16="http://schemas.microsoft.com/office/drawing/2014/main" id="{8C5CD8B7-22EE-39C5-D0A5-63E85AD5EE76}"/>
-              </a:ext>
-            </a:extLst>
-          </p:cNvPr>
+            <a:endParaRPr lang="en-US" dirty="0"/>
+          </a:p>
+        </p:txBody>
+      </p:sp>
+      <p:sp>
+        <p:nvSpPr>
+          <p:cNvPr id="3" name="Vertical Text Placeholder 2"/>
           <p:cNvSpPr>
             <a:spLocks noGrp="1"/>
           </p:cNvSpPr>
@@ -598,8 +531,8 @@
         </p:nvSpPr>
         <p:spPr>
           <a:xfrm>
-            <a:off x="838200" y="365125"/>
-            <a:ext cx="7734300" cy="5811838"/>
+            <a:off x="281365" y="217554"/>
+            <a:ext cx="2596227" cy="3462887"/>
           </a:xfrm>
         </p:spPr>
         <p:txBody>
@@ -639,19 +572,13 @@
               <a:rPr lang="en-GB"/>
               <a:t>Fifth level</a:t>
             </a:r>
-            <a:endParaRPr lang="en-US"/>
-          </a:p>
-        </p:txBody>
-      </p:sp>
-      <p:sp>
-        <p:nvSpPr>
-          <p:cNvPr id="4" name="Date Placeholder 3">
-            <a:extLst>
-              <a:ext uri="{FF2B5EF4-FFF2-40B4-BE49-F238E27FC236}">
-                <a16:creationId xmlns:a16="http://schemas.microsoft.com/office/drawing/2014/main" id="{A06FBCC5-5F3B-1601-1800-307156033C06}"/>
-              </a:ext>
-            </a:extLst>
-          </p:cNvPr>
+            <a:endParaRPr lang="en-US" dirty="0"/>
+          </a:p>
+        </p:txBody>
+      </p:sp>
+      <p:sp>
+        <p:nvSpPr>
+          <p:cNvPr id="4" name="Date Placeholder 3"/>
           <p:cNvSpPr>
             <a:spLocks noGrp="1"/>
           </p:cNvSpPr>
@@ -666,7 +593,7 @@
           <a:p>
             <a:fld id="{3F4ECB22-EC8D-AE46-A7E6-96BE5F73D66D}" type="datetimeFigureOut">
               <a:rPr lang="en-US" smtClean="0"/>
-              <a:t>2/11/24</a:t>
+              <a:t>2/19/24</a:t>
             </a:fld>
             <a:endParaRPr lang="en-US"/>
           </a:p>
@@ -674,13 +601,7 @@
       </p:sp>
       <p:sp>
         <p:nvSpPr>
-          <p:cNvPr id="5" name="Footer Placeholder 4">
-            <a:extLst>
-              <a:ext uri="{FF2B5EF4-FFF2-40B4-BE49-F238E27FC236}">
-                <a16:creationId xmlns:a16="http://schemas.microsoft.com/office/drawing/2014/main" id="{338CBDA9-C241-A8CA-2D00-0CF160535E5E}"/>
-              </a:ext>
-            </a:extLst>
-          </p:cNvPr>
+          <p:cNvPr id="5" name="Footer Placeholder 4"/>
           <p:cNvSpPr>
             <a:spLocks noGrp="1"/>
           </p:cNvSpPr>
@@ -699,13 +620,7 @@
       </p:sp>
       <p:sp>
         <p:nvSpPr>
-          <p:cNvPr id="6" name="Slide Number Placeholder 5">
-            <a:extLst>
-              <a:ext uri="{FF2B5EF4-FFF2-40B4-BE49-F238E27FC236}">
-                <a16:creationId xmlns:a16="http://schemas.microsoft.com/office/drawing/2014/main" id="{77C16950-1F13-D32B-11FC-734E86C75946}"/>
-              </a:ext>
-            </a:extLst>
-          </p:cNvPr>
+          <p:cNvPr id="6" name="Slide Number Placeholder 5"/>
           <p:cNvSpPr>
             <a:spLocks noGrp="1"/>
           </p:cNvSpPr>
@@ -729,7 +644,7 @@
     </p:spTree>
     <p:extLst>
       <p:ext uri="{BB962C8B-B14F-4D97-AF65-F5344CB8AC3E}">
-        <p14:creationId xmlns:p14="http://schemas.microsoft.com/office/powerpoint/2010/main" val="2522307867"/>
+        <p14:creationId xmlns:p14="http://schemas.microsoft.com/office/powerpoint/2010/main" val="683633242"/>
       </p:ext>
     </p:extLst>
   </p:cSld>
@@ -758,13 +673,7 @@
       </p:grpSpPr>
       <p:sp>
         <p:nvSpPr>
-          <p:cNvPr id="2" name="Title 1">
-            <a:extLst>
-              <a:ext uri="{FF2B5EF4-FFF2-40B4-BE49-F238E27FC236}">
-                <a16:creationId xmlns:a16="http://schemas.microsoft.com/office/drawing/2014/main" id="{431A3002-EFCB-D7B4-7B37-A879BF690FE3}"/>
-              </a:ext>
-            </a:extLst>
-          </p:cNvPr>
+          <p:cNvPr id="2" name="Title 1"/>
           <p:cNvSpPr>
             <a:spLocks noGrp="1"/>
           </p:cNvSpPr>
@@ -781,19 +690,13 @@
               <a:rPr lang="en-GB"/>
               <a:t>Click to edit Master title style</a:t>
             </a:r>
-            <a:endParaRPr lang="en-US"/>
-          </a:p>
-        </p:txBody>
-      </p:sp>
-      <p:sp>
-        <p:nvSpPr>
-          <p:cNvPr id="3" name="Content Placeholder 2">
-            <a:extLst>
-              <a:ext uri="{FF2B5EF4-FFF2-40B4-BE49-F238E27FC236}">
-                <a16:creationId xmlns:a16="http://schemas.microsoft.com/office/drawing/2014/main" id="{CEB61A76-0328-212F-E711-025E291B9EC8}"/>
-              </a:ext>
-            </a:extLst>
-          </p:cNvPr>
+            <a:endParaRPr lang="en-US" dirty="0"/>
+          </a:p>
+        </p:txBody>
+      </p:sp>
+      <p:sp>
+        <p:nvSpPr>
+          <p:cNvPr id="3" name="Content Placeholder 2"/>
           <p:cNvSpPr>
             <a:spLocks noGrp="1"/>
           </p:cNvSpPr>
@@ -839,19 +742,13 @@
               <a:rPr lang="en-GB"/>
               <a:t>Fifth level</a:t>
             </a:r>
-            <a:endParaRPr lang="en-US"/>
-          </a:p>
-        </p:txBody>
-      </p:sp>
-      <p:sp>
-        <p:nvSpPr>
-          <p:cNvPr id="4" name="Date Placeholder 3">
-            <a:extLst>
-              <a:ext uri="{FF2B5EF4-FFF2-40B4-BE49-F238E27FC236}">
-                <a16:creationId xmlns:a16="http://schemas.microsoft.com/office/drawing/2014/main" id="{2C5A39F3-018D-1C04-C4AA-DD5C5118E5DD}"/>
-              </a:ext>
-            </a:extLst>
-          </p:cNvPr>
+            <a:endParaRPr lang="en-US" dirty="0"/>
+          </a:p>
+        </p:txBody>
+      </p:sp>
+      <p:sp>
+        <p:nvSpPr>
+          <p:cNvPr id="4" name="Date Placeholder 3"/>
           <p:cNvSpPr>
             <a:spLocks noGrp="1"/>
           </p:cNvSpPr>
@@ -866,7 +763,7 @@
           <a:p>
             <a:fld id="{3F4ECB22-EC8D-AE46-A7E6-96BE5F73D66D}" type="datetimeFigureOut">
               <a:rPr lang="en-US" smtClean="0"/>
-              <a:t>2/11/24</a:t>
+              <a:t>2/19/24</a:t>
             </a:fld>
             <a:endParaRPr lang="en-US"/>
           </a:p>
@@ -874,13 +771,7 @@
       </p:sp>
       <p:sp>
         <p:nvSpPr>
-          <p:cNvPr id="5" name="Footer Placeholder 4">
-            <a:extLst>
-              <a:ext uri="{FF2B5EF4-FFF2-40B4-BE49-F238E27FC236}">
-                <a16:creationId xmlns:a16="http://schemas.microsoft.com/office/drawing/2014/main" id="{3F9ABE20-14B8-5F10-0ED6-27BB7BD16B66}"/>
-              </a:ext>
-            </a:extLst>
-          </p:cNvPr>
+          <p:cNvPr id="5" name="Footer Placeholder 4"/>
           <p:cNvSpPr>
             <a:spLocks noGrp="1"/>
           </p:cNvSpPr>
@@ -899,13 +790,7 @@
       </p:sp>
       <p:sp>
         <p:nvSpPr>
-          <p:cNvPr id="6" name="Slide Number Placeholder 5">
-            <a:extLst>
-              <a:ext uri="{FF2B5EF4-FFF2-40B4-BE49-F238E27FC236}">
-                <a16:creationId xmlns:a16="http://schemas.microsoft.com/office/drawing/2014/main" id="{C7C873C7-B642-9D7C-3522-4CE8D5E3F355}"/>
-              </a:ext>
-            </a:extLst>
-          </p:cNvPr>
+          <p:cNvPr id="6" name="Slide Number Placeholder 5"/>
           <p:cNvSpPr>
             <a:spLocks noGrp="1"/>
           </p:cNvSpPr>
@@ -929,7 +814,7 @@
     </p:spTree>
     <p:extLst>
       <p:ext uri="{BB962C8B-B14F-4D97-AF65-F5344CB8AC3E}">
-        <p14:creationId xmlns:p14="http://schemas.microsoft.com/office/powerpoint/2010/main" val="3419037563"/>
+        <p14:creationId xmlns:p14="http://schemas.microsoft.com/office/powerpoint/2010/main" val="669695255"/>
       </p:ext>
     </p:extLst>
   </p:cSld>
@@ -958,13 +843,7 @@
       </p:grpSpPr>
       <p:sp>
         <p:nvSpPr>
-          <p:cNvPr id="2" name="Title 1">
-            <a:extLst>
-              <a:ext uri="{FF2B5EF4-FFF2-40B4-BE49-F238E27FC236}">
-                <a16:creationId xmlns:a16="http://schemas.microsoft.com/office/drawing/2014/main" id="{0FFA4580-6737-81D9-819E-A5250D2FFE5D}"/>
-              </a:ext>
-            </a:extLst>
-          </p:cNvPr>
+          <p:cNvPr id="2" name="Title 1"/>
           <p:cNvSpPr>
             <a:spLocks noGrp="1"/>
           </p:cNvSpPr>
@@ -974,15 +853,15 @@
         </p:nvSpPr>
         <p:spPr>
           <a:xfrm>
-            <a:off x="831850" y="1709738"/>
-            <a:ext cx="10515600" cy="2852737"/>
+            <a:off x="279233" y="1018720"/>
+            <a:ext cx="3529846" cy="1699756"/>
           </a:xfrm>
         </p:spPr>
         <p:txBody>
           <a:bodyPr anchor="b"/>
           <a:lstStyle>
             <a:lvl1pPr>
-              <a:defRPr sz="6000"/>
+              <a:defRPr sz="2686"/>
             </a:lvl1pPr>
           </a:lstStyle>
           <a:p>
@@ -990,19 +869,13 @@
               <a:rPr lang="en-GB"/>
               <a:t>Click to edit Master title style</a:t>
             </a:r>
-            <a:endParaRPr lang="en-US"/>
-          </a:p>
-        </p:txBody>
-      </p:sp>
-      <p:sp>
-        <p:nvSpPr>
-          <p:cNvPr id="3" name="Text Placeholder 2">
-            <a:extLst>
-              <a:ext uri="{FF2B5EF4-FFF2-40B4-BE49-F238E27FC236}">
-                <a16:creationId xmlns:a16="http://schemas.microsoft.com/office/drawing/2014/main" id="{98037B32-F762-A934-5096-A9FE775C8ABD}"/>
-              </a:ext>
-            </a:extLst>
-          </p:cNvPr>
+            <a:endParaRPr lang="en-US" dirty="0"/>
+          </a:p>
+        </p:txBody>
+      </p:sp>
+      <p:sp>
+        <p:nvSpPr>
+          <p:cNvPr id="3" name="Text Placeholder 2"/>
           <p:cNvSpPr>
             <a:spLocks noGrp="1"/>
           </p:cNvSpPr>
@@ -1012,8 +885,8 @@
         </p:nvSpPr>
         <p:spPr>
           <a:xfrm>
-            <a:off x="831850" y="4589463"/>
-            <a:ext cx="10515600" cy="1500187"/>
+            <a:off x="279233" y="2734556"/>
+            <a:ext cx="3529846" cy="893861"/>
           </a:xfrm>
         </p:spPr>
         <p:txBody>
@@ -1021,17 +894,15 @@
           <a:lstStyle>
             <a:lvl1pPr marL="0" indent="0">
               <a:buNone/>
-              <a:defRPr sz="2400">
+              <a:defRPr sz="1074">
                 <a:solidFill>
-                  <a:schemeClr val="tx1">
-                    <a:tint val="75000"/>
-                  </a:schemeClr>
+                  <a:schemeClr val="tx1"/>
                 </a:solidFill>
               </a:defRPr>
             </a:lvl1pPr>
-            <a:lvl2pPr marL="457200" indent="0">
-              <a:buNone/>
-              <a:defRPr sz="2000">
+            <a:lvl2pPr marL="204643" indent="0">
+              <a:buNone/>
+              <a:defRPr sz="895">
                 <a:solidFill>
                   <a:schemeClr val="tx1">
                     <a:tint val="75000"/>
@@ -1039,9 +910,9 @@
                 </a:solidFill>
               </a:defRPr>
             </a:lvl2pPr>
-            <a:lvl3pPr marL="914400" indent="0">
-              <a:buNone/>
-              <a:defRPr sz="1800">
+            <a:lvl3pPr marL="409285" indent="0">
+              <a:buNone/>
+              <a:defRPr sz="806">
                 <a:solidFill>
                   <a:schemeClr val="tx1">
                     <a:tint val="75000"/>
@@ -1049,9 +920,9 @@
                 </a:solidFill>
               </a:defRPr>
             </a:lvl3pPr>
-            <a:lvl4pPr marL="1371600" indent="0">
-              <a:buNone/>
-              <a:defRPr sz="1600">
+            <a:lvl4pPr marL="613928" indent="0">
+              <a:buNone/>
+              <a:defRPr sz="716">
                 <a:solidFill>
                   <a:schemeClr val="tx1">
                     <a:tint val="75000"/>
@@ -1059,9 +930,9 @@
                 </a:solidFill>
               </a:defRPr>
             </a:lvl4pPr>
-            <a:lvl5pPr marL="1828800" indent="0">
-              <a:buNone/>
-              <a:defRPr sz="1600">
+            <a:lvl5pPr marL="818571" indent="0">
+              <a:buNone/>
+              <a:defRPr sz="716">
                 <a:solidFill>
                   <a:schemeClr val="tx1">
                     <a:tint val="75000"/>
@@ -1069,9 +940,9 @@
                 </a:solidFill>
               </a:defRPr>
             </a:lvl5pPr>
-            <a:lvl6pPr marL="2286000" indent="0">
-              <a:buNone/>
-              <a:defRPr sz="1600">
+            <a:lvl6pPr marL="1023214" indent="0">
+              <a:buNone/>
+              <a:defRPr sz="716">
                 <a:solidFill>
                   <a:schemeClr val="tx1">
                     <a:tint val="75000"/>
@@ -1079,9 +950,9 @@
                 </a:solidFill>
               </a:defRPr>
             </a:lvl6pPr>
-            <a:lvl7pPr marL="2743200" indent="0">
-              <a:buNone/>
-              <a:defRPr sz="1600">
+            <a:lvl7pPr marL="1227856" indent="0">
+              <a:buNone/>
+              <a:defRPr sz="716">
                 <a:solidFill>
                   <a:schemeClr val="tx1">
                     <a:tint val="75000"/>
@@ -1089,9 +960,9 @@
                 </a:solidFill>
               </a:defRPr>
             </a:lvl7pPr>
-            <a:lvl8pPr marL="3200400" indent="0">
-              <a:buNone/>
-              <a:defRPr sz="1600">
+            <a:lvl8pPr marL="1432499" indent="0">
+              <a:buNone/>
+              <a:defRPr sz="716">
                 <a:solidFill>
                   <a:schemeClr val="tx1">
                     <a:tint val="75000"/>
@@ -1099,9 +970,9 @@
                 </a:solidFill>
               </a:defRPr>
             </a:lvl8pPr>
-            <a:lvl9pPr marL="3657600" indent="0">
-              <a:buNone/>
-              <a:defRPr sz="1600">
+            <a:lvl9pPr marL="1637142" indent="0">
+              <a:buNone/>
+              <a:defRPr sz="716">
                 <a:solidFill>
                   <a:schemeClr val="tx1">
                     <a:tint val="75000"/>
@@ -1121,13 +992,7 @@
       </p:sp>
       <p:sp>
         <p:nvSpPr>
-          <p:cNvPr id="4" name="Date Placeholder 3">
-            <a:extLst>
-              <a:ext uri="{FF2B5EF4-FFF2-40B4-BE49-F238E27FC236}">
-                <a16:creationId xmlns:a16="http://schemas.microsoft.com/office/drawing/2014/main" id="{D4C172B8-B23F-200E-5AD4-E20ACF03AA9D}"/>
-              </a:ext>
-            </a:extLst>
-          </p:cNvPr>
+          <p:cNvPr id="4" name="Date Placeholder 3"/>
           <p:cNvSpPr>
             <a:spLocks noGrp="1"/>
           </p:cNvSpPr>
@@ -1142,7 +1007,7 @@
           <a:p>
             <a:fld id="{3F4ECB22-EC8D-AE46-A7E6-96BE5F73D66D}" type="datetimeFigureOut">
               <a:rPr lang="en-US" smtClean="0"/>
-              <a:t>2/11/24</a:t>
+              <a:t>2/19/24</a:t>
             </a:fld>
             <a:endParaRPr lang="en-US"/>
           </a:p>
@@ -1150,13 +1015,7 @@
       </p:sp>
       <p:sp>
         <p:nvSpPr>
-          <p:cNvPr id="5" name="Footer Placeholder 4">
-            <a:extLst>
-              <a:ext uri="{FF2B5EF4-FFF2-40B4-BE49-F238E27FC236}">
-                <a16:creationId xmlns:a16="http://schemas.microsoft.com/office/drawing/2014/main" id="{B90C6CED-992E-A766-0C55-DB9A0FED658C}"/>
-              </a:ext>
-            </a:extLst>
-          </p:cNvPr>
+          <p:cNvPr id="5" name="Footer Placeholder 4"/>
           <p:cNvSpPr>
             <a:spLocks noGrp="1"/>
           </p:cNvSpPr>
@@ -1175,13 +1034,7 @@
       </p:sp>
       <p:sp>
         <p:nvSpPr>
-          <p:cNvPr id="6" name="Slide Number Placeholder 5">
-            <a:extLst>
-              <a:ext uri="{FF2B5EF4-FFF2-40B4-BE49-F238E27FC236}">
-                <a16:creationId xmlns:a16="http://schemas.microsoft.com/office/drawing/2014/main" id="{1AA8A243-AD60-CDC7-9468-8C3A8E7EA3BF}"/>
-              </a:ext>
-            </a:extLst>
-          </p:cNvPr>
+          <p:cNvPr id="6" name="Slide Number Placeholder 5"/>
           <p:cNvSpPr>
             <a:spLocks noGrp="1"/>
           </p:cNvSpPr>
@@ -1205,7 +1058,7 @@
     </p:spTree>
     <p:extLst>
       <p:ext uri="{BB962C8B-B14F-4D97-AF65-F5344CB8AC3E}">
-        <p14:creationId xmlns:p14="http://schemas.microsoft.com/office/powerpoint/2010/main" val="1824141994"/>
+        <p14:creationId xmlns:p14="http://schemas.microsoft.com/office/powerpoint/2010/main" val="2741464206"/>
       </p:ext>
     </p:extLst>
   </p:cSld>
@@ -1234,13 +1087,7 @@
       </p:grpSpPr>
       <p:sp>
         <p:nvSpPr>
-          <p:cNvPr id="2" name="Title 1">
-            <a:extLst>
-              <a:ext uri="{FF2B5EF4-FFF2-40B4-BE49-F238E27FC236}">
-                <a16:creationId xmlns:a16="http://schemas.microsoft.com/office/drawing/2014/main" id="{98A723B5-46FD-B338-646F-E73BED316A45}"/>
-              </a:ext>
-            </a:extLst>
-          </p:cNvPr>
+          <p:cNvPr id="2" name="Title 1"/>
           <p:cNvSpPr>
             <a:spLocks noGrp="1"/>
           </p:cNvSpPr>
@@ -1257,19 +1104,13 @@
               <a:rPr lang="en-GB"/>
               <a:t>Click to edit Master title style</a:t>
             </a:r>
-            <a:endParaRPr lang="en-US"/>
-          </a:p>
-        </p:txBody>
-      </p:sp>
-      <p:sp>
-        <p:nvSpPr>
-          <p:cNvPr id="3" name="Content Placeholder 2">
-            <a:extLst>
-              <a:ext uri="{FF2B5EF4-FFF2-40B4-BE49-F238E27FC236}">
-                <a16:creationId xmlns:a16="http://schemas.microsoft.com/office/drawing/2014/main" id="{7C94C6EF-A5AE-6EF9-3EAF-F49D8D94C491}"/>
-              </a:ext>
-            </a:extLst>
-          </p:cNvPr>
+            <a:endParaRPr lang="en-US" dirty="0"/>
+          </a:p>
+        </p:txBody>
+      </p:sp>
+      <p:sp>
+        <p:nvSpPr>
+          <p:cNvPr id="3" name="Content Placeholder 2"/>
           <p:cNvSpPr>
             <a:spLocks noGrp="1"/>
           </p:cNvSpPr>
@@ -1279,8 +1120,8 @@
         </p:nvSpPr>
         <p:spPr>
           <a:xfrm>
-            <a:off x="838200" y="1825625"/>
-            <a:ext cx="5181600" cy="4351338"/>
+            <a:off x="281365" y="1087768"/>
+            <a:ext cx="1739344" cy="2592672"/>
           </a:xfrm>
         </p:spPr>
         <p:txBody>
@@ -1320,19 +1161,13 @@
               <a:rPr lang="en-GB"/>
               <a:t>Fifth level</a:t>
             </a:r>
-            <a:endParaRPr lang="en-US"/>
-          </a:p>
-        </p:txBody>
-      </p:sp>
-      <p:sp>
-        <p:nvSpPr>
-          <p:cNvPr id="4" name="Content Placeholder 3">
-            <a:extLst>
-              <a:ext uri="{FF2B5EF4-FFF2-40B4-BE49-F238E27FC236}">
-                <a16:creationId xmlns:a16="http://schemas.microsoft.com/office/drawing/2014/main" id="{31F3BF49-6CE4-27A0-3070-8448D5941D4B}"/>
-              </a:ext>
-            </a:extLst>
-          </p:cNvPr>
+            <a:endParaRPr lang="en-US" dirty="0"/>
+          </a:p>
+        </p:txBody>
+      </p:sp>
+      <p:sp>
+        <p:nvSpPr>
+          <p:cNvPr id="4" name="Content Placeholder 3"/>
           <p:cNvSpPr>
             <a:spLocks noGrp="1"/>
           </p:cNvSpPr>
@@ -1342,8 +1177,8 @@
         </p:nvSpPr>
         <p:spPr>
           <a:xfrm>
-            <a:off x="6172200" y="1825625"/>
-            <a:ext cx="5181600" cy="4351338"/>
+            <a:off x="2071866" y="1087768"/>
+            <a:ext cx="1739344" cy="2592672"/>
           </a:xfrm>
         </p:spPr>
         <p:txBody>
@@ -1383,19 +1218,13 @@
               <a:rPr lang="en-GB"/>
               <a:t>Fifth level</a:t>
             </a:r>
-            <a:endParaRPr lang="en-US"/>
-          </a:p>
-        </p:txBody>
-      </p:sp>
-      <p:sp>
-        <p:nvSpPr>
-          <p:cNvPr id="5" name="Date Placeholder 4">
-            <a:extLst>
-              <a:ext uri="{FF2B5EF4-FFF2-40B4-BE49-F238E27FC236}">
-                <a16:creationId xmlns:a16="http://schemas.microsoft.com/office/drawing/2014/main" id="{A8796A79-4A7E-603C-0A89-14691C9DCE18}"/>
-              </a:ext>
-            </a:extLst>
-          </p:cNvPr>
+            <a:endParaRPr lang="en-US" dirty="0"/>
+          </a:p>
+        </p:txBody>
+      </p:sp>
+      <p:sp>
+        <p:nvSpPr>
+          <p:cNvPr id="5" name="Date Placeholder 4"/>
           <p:cNvSpPr>
             <a:spLocks noGrp="1"/>
           </p:cNvSpPr>
@@ -1410,7 +1239,7 @@
           <a:p>
             <a:fld id="{3F4ECB22-EC8D-AE46-A7E6-96BE5F73D66D}" type="datetimeFigureOut">
               <a:rPr lang="en-US" smtClean="0"/>
-              <a:t>2/11/24</a:t>
+              <a:t>2/19/24</a:t>
             </a:fld>
             <a:endParaRPr lang="en-US"/>
           </a:p>
@@ -1418,13 +1247,7 @@
       </p:sp>
       <p:sp>
         <p:nvSpPr>
-          <p:cNvPr id="6" name="Footer Placeholder 5">
-            <a:extLst>
-              <a:ext uri="{FF2B5EF4-FFF2-40B4-BE49-F238E27FC236}">
-                <a16:creationId xmlns:a16="http://schemas.microsoft.com/office/drawing/2014/main" id="{9FC76C5A-D1CB-DCDA-9A82-DBE359412425}"/>
-              </a:ext>
-            </a:extLst>
-          </p:cNvPr>
+          <p:cNvPr id="6" name="Footer Placeholder 5"/>
           <p:cNvSpPr>
             <a:spLocks noGrp="1"/>
           </p:cNvSpPr>
@@ -1443,13 +1266,7 @@
       </p:sp>
       <p:sp>
         <p:nvSpPr>
-          <p:cNvPr id="7" name="Slide Number Placeholder 6">
-            <a:extLst>
-              <a:ext uri="{FF2B5EF4-FFF2-40B4-BE49-F238E27FC236}">
-                <a16:creationId xmlns:a16="http://schemas.microsoft.com/office/drawing/2014/main" id="{0DA3DC4A-6FB9-5E0B-B927-75EEDBD9389B}"/>
-              </a:ext>
-            </a:extLst>
-          </p:cNvPr>
+          <p:cNvPr id="7" name="Slide Number Placeholder 6"/>
           <p:cNvSpPr>
             <a:spLocks noGrp="1"/>
           </p:cNvSpPr>
@@ -1473,7 +1290,7 @@
     </p:spTree>
     <p:extLst>
       <p:ext uri="{BB962C8B-B14F-4D97-AF65-F5344CB8AC3E}">
-        <p14:creationId xmlns:p14="http://schemas.microsoft.com/office/powerpoint/2010/main" val="2379550786"/>
+        <p14:creationId xmlns:p14="http://schemas.microsoft.com/office/powerpoint/2010/main" val="2366837358"/>
       </p:ext>
     </p:extLst>
   </p:cSld>
@@ -1502,13 +1319,7 @@
       </p:grpSpPr>
       <p:sp>
         <p:nvSpPr>
-          <p:cNvPr id="2" name="Title 1">
-            <a:extLst>
-              <a:ext uri="{FF2B5EF4-FFF2-40B4-BE49-F238E27FC236}">
-                <a16:creationId xmlns:a16="http://schemas.microsoft.com/office/drawing/2014/main" id="{9CA1FED5-4BE8-C5B0-BF54-81F70DDFFA86}"/>
-              </a:ext>
-            </a:extLst>
-          </p:cNvPr>
+          <p:cNvPr id="2" name="Title 1"/>
           <p:cNvSpPr>
             <a:spLocks noGrp="1"/>
           </p:cNvSpPr>
@@ -1518,8 +1329,8 @@
         </p:nvSpPr>
         <p:spPr>
           <a:xfrm>
-            <a:off x="839788" y="365125"/>
-            <a:ext cx="10515600" cy="1325563"/>
+            <a:off x="281898" y="217554"/>
+            <a:ext cx="3529846" cy="789815"/>
           </a:xfrm>
         </p:spPr>
         <p:txBody>
@@ -1530,19 +1341,13 @@
               <a:rPr lang="en-GB"/>
               <a:t>Click to edit Master title style</a:t>
             </a:r>
-            <a:endParaRPr lang="en-US"/>
-          </a:p>
-        </p:txBody>
-      </p:sp>
-      <p:sp>
-        <p:nvSpPr>
-          <p:cNvPr id="3" name="Text Placeholder 2">
-            <a:extLst>
-              <a:ext uri="{FF2B5EF4-FFF2-40B4-BE49-F238E27FC236}">
-                <a16:creationId xmlns:a16="http://schemas.microsoft.com/office/drawing/2014/main" id="{6FA200CF-8C36-DB5D-F448-6B7617C88EE6}"/>
-              </a:ext>
-            </a:extLst>
-          </p:cNvPr>
+            <a:endParaRPr lang="en-US" dirty="0"/>
+          </a:p>
+        </p:txBody>
+      </p:sp>
+      <p:sp>
+        <p:nvSpPr>
+          <p:cNvPr id="3" name="Text Placeholder 2"/>
           <p:cNvSpPr>
             <a:spLocks noGrp="1"/>
           </p:cNvSpPr>
@@ -1552,8 +1357,8 @@
         </p:nvSpPr>
         <p:spPr>
           <a:xfrm>
-            <a:off x="839788" y="1681163"/>
-            <a:ext cx="5157787" cy="823912"/>
+            <a:off x="281898" y="1001693"/>
+            <a:ext cx="1731351" cy="490914"/>
           </a:xfrm>
         </p:spPr>
         <p:txBody>
@@ -1561,39 +1366,39 @@
           <a:lstStyle>
             <a:lvl1pPr marL="0" indent="0">
               <a:buNone/>
-              <a:defRPr sz="2400" b="1"/>
+              <a:defRPr sz="1074" b="1"/>
             </a:lvl1pPr>
-            <a:lvl2pPr marL="457200" indent="0">
-              <a:buNone/>
-              <a:defRPr sz="2000" b="1"/>
+            <a:lvl2pPr marL="204643" indent="0">
+              <a:buNone/>
+              <a:defRPr sz="895" b="1"/>
             </a:lvl2pPr>
-            <a:lvl3pPr marL="914400" indent="0">
-              <a:buNone/>
-              <a:defRPr sz="1800" b="1"/>
+            <a:lvl3pPr marL="409285" indent="0">
+              <a:buNone/>
+              <a:defRPr sz="806" b="1"/>
             </a:lvl3pPr>
-            <a:lvl4pPr marL="1371600" indent="0">
-              <a:buNone/>
-              <a:defRPr sz="1600" b="1"/>
+            <a:lvl4pPr marL="613928" indent="0">
+              <a:buNone/>
+              <a:defRPr sz="716" b="1"/>
             </a:lvl4pPr>
-            <a:lvl5pPr marL="1828800" indent="0">
-              <a:buNone/>
-              <a:defRPr sz="1600" b="1"/>
+            <a:lvl5pPr marL="818571" indent="0">
+              <a:buNone/>
+              <a:defRPr sz="716" b="1"/>
             </a:lvl5pPr>
-            <a:lvl6pPr marL="2286000" indent="0">
-              <a:buNone/>
-              <a:defRPr sz="1600" b="1"/>
+            <a:lvl6pPr marL="1023214" indent="0">
+              <a:buNone/>
+              <a:defRPr sz="716" b="1"/>
             </a:lvl6pPr>
-            <a:lvl7pPr marL="2743200" indent="0">
-              <a:buNone/>
-              <a:defRPr sz="1600" b="1"/>
+            <a:lvl7pPr marL="1227856" indent="0">
+              <a:buNone/>
+              <a:defRPr sz="716" b="1"/>
             </a:lvl7pPr>
-            <a:lvl8pPr marL="3200400" indent="0">
-              <a:buNone/>
-              <a:defRPr sz="1600" b="1"/>
+            <a:lvl8pPr marL="1432499" indent="0">
+              <a:buNone/>
+              <a:defRPr sz="716" b="1"/>
             </a:lvl8pPr>
-            <a:lvl9pPr marL="3657600" indent="0">
-              <a:buNone/>
-              <a:defRPr sz="1600" b="1"/>
+            <a:lvl9pPr marL="1637142" indent="0">
+              <a:buNone/>
+              <a:defRPr sz="716" b="1"/>
             </a:lvl9pPr>
           </a:lstStyle>
           <a:p>
@@ -1607,13 +1412,7 @@
       </p:sp>
       <p:sp>
         <p:nvSpPr>
-          <p:cNvPr id="4" name="Content Placeholder 3">
-            <a:extLst>
-              <a:ext uri="{FF2B5EF4-FFF2-40B4-BE49-F238E27FC236}">
-                <a16:creationId xmlns:a16="http://schemas.microsoft.com/office/drawing/2014/main" id="{BB53E684-2479-27CD-4D62-B8D94018595B}"/>
-              </a:ext>
-            </a:extLst>
-          </p:cNvPr>
+          <p:cNvPr id="4" name="Content Placeholder 3"/>
           <p:cNvSpPr>
             <a:spLocks noGrp="1"/>
           </p:cNvSpPr>
@@ -1623,8 +1422,8 @@
         </p:nvSpPr>
         <p:spPr>
           <a:xfrm>
-            <a:off x="839788" y="2505075"/>
-            <a:ext cx="5157787" cy="3684588"/>
+            <a:off x="281898" y="1492607"/>
+            <a:ext cx="1731351" cy="2195400"/>
           </a:xfrm>
         </p:spPr>
         <p:txBody>
@@ -1664,19 +1463,13 @@
               <a:rPr lang="en-GB"/>
               <a:t>Fifth level</a:t>
             </a:r>
-            <a:endParaRPr lang="en-US"/>
-          </a:p>
-        </p:txBody>
-      </p:sp>
-      <p:sp>
-        <p:nvSpPr>
-          <p:cNvPr id="5" name="Text Placeholder 4">
-            <a:extLst>
-              <a:ext uri="{FF2B5EF4-FFF2-40B4-BE49-F238E27FC236}">
-                <a16:creationId xmlns:a16="http://schemas.microsoft.com/office/drawing/2014/main" id="{E4C65046-0EBF-1C7B-6460-12B8E45ACE6E}"/>
-              </a:ext>
-            </a:extLst>
-          </p:cNvPr>
+            <a:endParaRPr lang="en-US" dirty="0"/>
+          </a:p>
+        </p:txBody>
+      </p:sp>
+      <p:sp>
+        <p:nvSpPr>
+          <p:cNvPr id="5" name="Text Placeholder 4"/>
           <p:cNvSpPr>
             <a:spLocks noGrp="1"/>
           </p:cNvSpPr>
@@ -1686,8 +1479,8 @@
         </p:nvSpPr>
         <p:spPr>
           <a:xfrm>
-            <a:off x="6172200" y="1681163"/>
-            <a:ext cx="5183188" cy="823912"/>
+            <a:off x="2071867" y="1001693"/>
+            <a:ext cx="1739877" cy="490914"/>
           </a:xfrm>
         </p:spPr>
         <p:txBody>
@@ -1695,39 +1488,39 @@
           <a:lstStyle>
             <a:lvl1pPr marL="0" indent="0">
               <a:buNone/>
-              <a:defRPr sz="2400" b="1"/>
+              <a:defRPr sz="1074" b="1"/>
             </a:lvl1pPr>
-            <a:lvl2pPr marL="457200" indent="0">
-              <a:buNone/>
-              <a:defRPr sz="2000" b="1"/>
+            <a:lvl2pPr marL="204643" indent="0">
+              <a:buNone/>
+              <a:defRPr sz="895" b="1"/>
             </a:lvl2pPr>
-            <a:lvl3pPr marL="914400" indent="0">
-              <a:buNone/>
-              <a:defRPr sz="1800" b="1"/>
+            <a:lvl3pPr marL="409285" indent="0">
+              <a:buNone/>
+              <a:defRPr sz="806" b="1"/>
             </a:lvl3pPr>
-            <a:lvl4pPr marL="1371600" indent="0">
-              <a:buNone/>
-              <a:defRPr sz="1600" b="1"/>
+            <a:lvl4pPr marL="613928" indent="0">
+              <a:buNone/>
+              <a:defRPr sz="716" b="1"/>
             </a:lvl4pPr>
-            <a:lvl5pPr marL="1828800" indent="0">
-              <a:buNone/>
-              <a:defRPr sz="1600" b="1"/>
+            <a:lvl5pPr marL="818571" indent="0">
+              <a:buNone/>
+              <a:defRPr sz="716" b="1"/>
             </a:lvl5pPr>
-            <a:lvl6pPr marL="2286000" indent="0">
-              <a:buNone/>
-              <a:defRPr sz="1600" b="1"/>
+            <a:lvl6pPr marL="1023214" indent="0">
+              <a:buNone/>
+              <a:defRPr sz="716" b="1"/>
             </a:lvl6pPr>
-            <a:lvl7pPr marL="2743200" indent="0">
-              <a:buNone/>
-              <a:defRPr sz="1600" b="1"/>
+            <a:lvl7pPr marL="1227856" indent="0">
+              <a:buNone/>
+              <a:defRPr sz="716" b="1"/>
             </a:lvl7pPr>
-            <a:lvl8pPr marL="3200400" indent="0">
-              <a:buNone/>
-              <a:defRPr sz="1600" b="1"/>
+            <a:lvl8pPr marL="1432499" indent="0">
+              <a:buNone/>
+              <a:defRPr sz="716" b="1"/>
             </a:lvl8pPr>
-            <a:lvl9pPr marL="3657600" indent="0">
-              <a:buNone/>
-              <a:defRPr sz="1600" b="1"/>
+            <a:lvl9pPr marL="1637142" indent="0">
+              <a:buNone/>
+              <a:defRPr sz="716" b="1"/>
             </a:lvl9pPr>
           </a:lstStyle>
           <a:p>
@@ -1741,13 +1534,7 @@
       </p:sp>
       <p:sp>
         <p:nvSpPr>
-          <p:cNvPr id="6" name="Content Placeholder 5">
-            <a:extLst>
-              <a:ext uri="{FF2B5EF4-FFF2-40B4-BE49-F238E27FC236}">
-                <a16:creationId xmlns:a16="http://schemas.microsoft.com/office/drawing/2014/main" id="{8014422C-C6EA-6F3C-70CD-46411DDA70CC}"/>
-              </a:ext>
-            </a:extLst>
-          </p:cNvPr>
+          <p:cNvPr id="6" name="Content Placeholder 5"/>
           <p:cNvSpPr>
             <a:spLocks noGrp="1"/>
           </p:cNvSpPr>
@@ -1757,8 +1544,8 @@
         </p:nvSpPr>
         <p:spPr>
           <a:xfrm>
-            <a:off x="6172200" y="2505075"/>
-            <a:ext cx="5183188" cy="3684588"/>
+            <a:off x="2071867" y="1492607"/>
+            <a:ext cx="1739877" cy="2195400"/>
           </a:xfrm>
         </p:spPr>
         <p:txBody>
@@ -1798,19 +1585,13 @@
               <a:rPr lang="en-GB"/>
               <a:t>Fifth level</a:t>
             </a:r>
-            <a:endParaRPr lang="en-US"/>
-          </a:p>
-        </p:txBody>
-      </p:sp>
-      <p:sp>
-        <p:nvSpPr>
-          <p:cNvPr id="7" name="Date Placeholder 6">
-            <a:extLst>
-              <a:ext uri="{FF2B5EF4-FFF2-40B4-BE49-F238E27FC236}">
-                <a16:creationId xmlns:a16="http://schemas.microsoft.com/office/drawing/2014/main" id="{92F9E68F-233D-C3B8-61A5-D025899F7271}"/>
-              </a:ext>
-            </a:extLst>
-          </p:cNvPr>
+            <a:endParaRPr lang="en-US" dirty="0"/>
+          </a:p>
+        </p:txBody>
+      </p:sp>
+      <p:sp>
+        <p:nvSpPr>
+          <p:cNvPr id="7" name="Date Placeholder 6"/>
           <p:cNvSpPr>
             <a:spLocks noGrp="1"/>
           </p:cNvSpPr>
@@ -1825,7 +1606,7 @@
           <a:p>
             <a:fld id="{3F4ECB22-EC8D-AE46-A7E6-96BE5F73D66D}" type="datetimeFigureOut">
               <a:rPr lang="en-US" smtClean="0"/>
-              <a:t>2/11/24</a:t>
+              <a:t>2/19/24</a:t>
             </a:fld>
             <a:endParaRPr lang="en-US"/>
           </a:p>
@@ -1833,13 +1614,7 @@
       </p:sp>
       <p:sp>
         <p:nvSpPr>
-          <p:cNvPr id="8" name="Footer Placeholder 7">
-            <a:extLst>
-              <a:ext uri="{FF2B5EF4-FFF2-40B4-BE49-F238E27FC236}">
-                <a16:creationId xmlns:a16="http://schemas.microsoft.com/office/drawing/2014/main" id="{54943F81-96EB-CCF8-BEEF-49749B4A1F97}"/>
-              </a:ext>
-            </a:extLst>
-          </p:cNvPr>
+          <p:cNvPr id="8" name="Footer Placeholder 7"/>
           <p:cNvSpPr>
             <a:spLocks noGrp="1"/>
           </p:cNvSpPr>
@@ -1858,13 +1633,7 @@
       </p:sp>
       <p:sp>
         <p:nvSpPr>
-          <p:cNvPr id="9" name="Slide Number Placeholder 8">
-            <a:extLst>
-              <a:ext uri="{FF2B5EF4-FFF2-40B4-BE49-F238E27FC236}">
-                <a16:creationId xmlns:a16="http://schemas.microsoft.com/office/drawing/2014/main" id="{FB581145-73CC-973A-0FA9-E17EBD6CF3CB}"/>
-              </a:ext>
-            </a:extLst>
-          </p:cNvPr>
+          <p:cNvPr id="9" name="Slide Number Placeholder 8"/>
           <p:cNvSpPr>
             <a:spLocks noGrp="1"/>
           </p:cNvSpPr>
@@ -1888,7 +1657,7 @@
     </p:spTree>
     <p:extLst>
       <p:ext uri="{BB962C8B-B14F-4D97-AF65-F5344CB8AC3E}">
-        <p14:creationId xmlns:p14="http://schemas.microsoft.com/office/powerpoint/2010/main" val="2799457097"/>
+        <p14:creationId xmlns:p14="http://schemas.microsoft.com/office/powerpoint/2010/main" val="223152488"/>
       </p:ext>
     </p:extLst>
   </p:cSld>
@@ -1917,13 +1686,7 @@
       </p:grpSpPr>
       <p:sp>
         <p:nvSpPr>
-          <p:cNvPr id="2" name="Title 1">
-            <a:extLst>
-              <a:ext uri="{FF2B5EF4-FFF2-40B4-BE49-F238E27FC236}">
-                <a16:creationId xmlns:a16="http://schemas.microsoft.com/office/drawing/2014/main" id="{2F7194B0-4EFB-34A8-0203-9C33896B37C5}"/>
-              </a:ext>
-            </a:extLst>
-          </p:cNvPr>
+          <p:cNvPr id="2" name="Title 1"/>
           <p:cNvSpPr>
             <a:spLocks noGrp="1"/>
           </p:cNvSpPr>
@@ -1940,19 +1703,13 @@
               <a:rPr lang="en-GB"/>
               <a:t>Click to edit Master title style</a:t>
             </a:r>
-            <a:endParaRPr lang="en-US"/>
-          </a:p>
-        </p:txBody>
-      </p:sp>
-      <p:sp>
-        <p:nvSpPr>
-          <p:cNvPr id="3" name="Date Placeholder 2">
-            <a:extLst>
-              <a:ext uri="{FF2B5EF4-FFF2-40B4-BE49-F238E27FC236}">
-                <a16:creationId xmlns:a16="http://schemas.microsoft.com/office/drawing/2014/main" id="{167B4FFA-932B-DFF4-63A5-983DA747B5EF}"/>
-              </a:ext>
-            </a:extLst>
-          </p:cNvPr>
+            <a:endParaRPr lang="en-US" dirty="0"/>
+          </a:p>
+        </p:txBody>
+      </p:sp>
+      <p:sp>
+        <p:nvSpPr>
+          <p:cNvPr id="3" name="Date Placeholder 2"/>
           <p:cNvSpPr>
             <a:spLocks noGrp="1"/>
           </p:cNvSpPr>
@@ -1967,7 +1724,7 @@
           <a:p>
             <a:fld id="{3F4ECB22-EC8D-AE46-A7E6-96BE5F73D66D}" type="datetimeFigureOut">
               <a:rPr lang="en-US" smtClean="0"/>
-              <a:t>2/11/24</a:t>
+              <a:t>2/19/24</a:t>
             </a:fld>
             <a:endParaRPr lang="en-US"/>
           </a:p>
@@ -1975,13 +1732,7 @@
       </p:sp>
       <p:sp>
         <p:nvSpPr>
-          <p:cNvPr id="4" name="Footer Placeholder 3">
-            <a:extLst>
-              <a:ext uri="{FF2B5EF4-FFF2-40B4-BE49-F238E27FC236}">
-                <a16:creationId xmlns:a16="http://schemas.microsoft.com/office/drawing/2014/main" id="{0ADF6B70-EFB2-21B6-ED59-B3A8D1518194}"/>
-              </a:ext>
-            </a:extLst>
-          </p:cNvPr>
+          <p:cNvPr id="4" name="Footer Placeholder 3"/>
           <p:cNvSpPr>
             <a:spLocks noGrp="1"/>
           </p:cNvSpPr>
@@ -2000,13 +1751,7 @@
       </p:sp>
       <p:sp>
         <p:nvSpPr>
-          <p:cNvPr id="5" name="Slide Number Placeholder 4">
-            <a:extLst>
-              <a:ext uri="{FF2B5EF4-FFF2-40B4-BE49-F238E27FC236}">
-                <a16:creationId xmlns:a16="http://schemas.microsoft.com/office/drawing/2014/main" id="{94AC17AC-F1C2-4777-560C-0DC73A6D6392}"/>
-              </a:ext>
-            </a:extLst>
-          </p:cNvPr>
+          <p:cNvPr id="5" name="Slide Number Placeholder 4"/>
           <p:cNvSpPr>
             <a:spLocks noGrp="1"/>
           </p:cNvSpPr>
@@ -2030,7 +1775,7 @@
     </p:spTree>
     <p:extLst>
       <p:ext uri="{BB962C8B-B14F-4D97-AF65-F5344CB8AC3E}">
-        <p14:creationId xmlns:p14="http://schemas.microsoft.com/office/powerpoint/2010/main" val="3405442270"/>
+        <p14:creationId xmlns:p14="http://schemas.microsoft.com/office/powerpoint/2010/main" val="1216910067"/>
       </p:ext>
     </p:extLst>
   </p:cSld>
@@ -2059,13 +1804,7 @@
       </p:grpSpPr>
       <p:sp>
         <p:nvSpPr>
-          <p:cNvPr id="2" name="Date Placeholder 1">
-            <a:extLst>
-              <a:ext uri="{FF2B5EF4-FFF2-40B4-BE49-F238E27FC236}">
-                <a16:creationId xmlns:a16="http://schemas.microsoft.com/office/drawing/2014/main" id="{F62A885C-4A70-955B-F03E-3EAC5689946D}"/>
-              </a:ext>
-            </a:extLst>
-          </p:cNvPr>
+          <p:cNvPr id="2" name="Date Placeholder 1"/>
           <p:cNvSpPr>
             <a:spLocks noGrp="1"/>
           </p:cNvSpPr>
@@ -2080,7 +1819,7 @@
           <a:p>
             <a:fld id="{3F4ECB22-EC8D-AE46-A7E6-96BE5F73D66D}" type="datetimeFigureOut">
               <a:rPr lang="en-US" smtClean="0"/>
-              <a:t>2/11/24</a:t>
+              <a:t>2/19/24</a:t>
             </a:fld>
             <a:endParaRPr lang="en-US"/>
           </a:p>
@@ -2088,13 +1827,7 @@
       </p:sp>
       <p:sp>
         <p:nvSpPr>
-          <p:cNvPr id="3" name="Footer Placeholder 2">
-            <a:extLst>
-              <a:ext uri="{FF2B5EF4-FFF2-40B4-BE49-F238E27FC236}">
-                <a16:creationId xmlns:a16="http://schemas.microsoft.com/office/drawing/2014/main" id="{F6452C3B-8E13-BAD8-D43F-22C7578D099A}"/>
-              </a:ext>
-            </a:extLst>
-          </p:cNvPr>
+          <p:cNvPr id="3" name="Footer Placeholder 2"/>
           <p:cNvSpPr>
             <a:spLocks noGrp="1"/>
           </p:cNvSpPr>
@@ -2113,13 +1846,7 @@
       </p:sp>
       <p:sp>
         <p:nvSpPr>
-          <p:cNvPr id="4" name="Slide Number Placeholder 3">
-            <a:extLst>
-              <a:ext uri="{FF2B5EF4-FFF2-40B4-BE49-F238E27FC236}">
-                <a16:creationId xmlns:a16="http://schemas.microsoft.com/office/drawing/2014/main" id="{EFBF2079-CCCB-F027-16E4-F23795EC84EB}"/>
-              </a:ext>
-            </a:extLst>
-          </p:cNvPr>
+          <p:cNvPr id="4" name="Slide Number Placeholder 3"/>
           <p:cNvSpPr>
             <a:spLocks noGrp="1"/>
           </p:cNvSpPr>
@@ -2143,7 +1870,7 @@
     </p:spTree>
     <p:extLst>
       <p:ext uri="{BB962C8B-B14F-4D97-AF65-F5344CB8AC3E}">
-        <p14:creationId xmlns:p14="http://schemas.microsoft.com/office/powerpoint/2010/main" val="1928493519"/>
+        <p14:creationId xmlns:p14="http://schemas.microsoft.com/office/powerpoint/2010/main" val="1456430977"/>
       </p:ext>
     </p:extLst>
   </p:cSld>
@@ -2172,13 +1899,7 @@
       </p:grpSpPr>
       <p:sp>
         <p:nvSpPr>
-          <p:cNvPr id="2" name="Title 1">
-            <a:extLst>
-              <a:ext uri="{FF2B5EF4-FFF2-40B4-BE49-F238E27FC236}">
-                <a16:creationId xmlns:a16="http://schemas.microsoft.com/office/drawing/2014/main" id="{0879C770-6CB7-1594-3570-545E709F8904}"/>
-              </a:ext>
-            </a:extLst>
-          </p:cNvPr>
+          <p:cNvPr id="2" name="Title 1"/>
           <p:cNvSpPr>
             <a:spLocks noGrp="1"/>
           </p:cNvSpPr>
@@ -2188,15 +1909,15 @@
         </p:nvSpPr>
         <p:spPr>
           <a:xfrm>
-            <a:off x="839788" y="457200"/>
-            <a:ext cx="3932237" cy="1600200"/>
+            <a:off x="281898" y="272415"/>
+            <a:ext cx="1319962" cy="953453"/>
           </a:xfrm>
         </p:spPr>
         <p:txBody>
           <a:bodyPr anchor="b"/>
           <a:lstStyle>
             <a:lvl1pPr>
-              <a:defRPr sz="3200"/>
+              <a:defRPr sz="1432"/>
             </a:lvl1pPr>
           </a:lstStyle>
           <a:p>
@@ -2204,19 +1925,13 @@
               <a:rPr lang="en-GB"/>
               <a:t>Click to edit Master title style</a:t>
             </a:r>
-            <a:endParaRPr lang="en-US"/>
-          </a:p>
-        </p:txBody>
-      </p:sp>
-      <p:sp>
-        <p:nvSpPr>
-          <p:cNvPr id="3" name="Content Placeholder 2">
-            <a:extLst>
-              <a:ext uri="{FF2B5EF4-FFF2-40B4-BE49-F238E27FC236}">
-                <a16:creationId xmlns:a16="http://schemas.microsoft.com/office/drawing/2014/main" id="{E15CCAB5-5555-08E8-A9BF-AC81F58D804A}"/>
-              </a:ext>
-            </a:extLst>
-          </p:cNvPr>
+            <a:endParaRPr lang="en-US" dirty="0"/>
+          </a:p>
+        </p:txBody>
+      </p:sp>
+      <p:sp>
+        <p:nvSpPr>
+          <p:cNvPr id="3" name="Content Placeholder 2"/>
           <p:cNvSpPr>
             <a:spLocks noGrp="1"/>
           </p:cNvSpPr>
@@ -2226,39 +1941,39 @@
         </p:nvSpPr>
         <p:spPr>
           <a:xfrm>
-            <a:off x="5183188" y="987425"/>
-            <a:ext cx="6172200" cy="4873625"/>
+            <a:off x="1739877" y="588342"/>
+            <a:ext cx="2071866" cy="2903868"/>
           </a:xfrm>
         </p:spPr>
         <p:txBody>
           <a:bodyPr/>
           <a:lstStyle>
             <a:lvl1pPr>
-              <a:defRPr sz="3200"/>
+              <a:defRPr sz="1432"/>
             </a:lvl1pPr>
             <a:lvl2pPr>
-              <a:defRPr sz="2800"/>
+              <a:defRPr sz="1253"/>
             </a:lvl2pPr>
             <a:lvl3pPr>
-              <a:defRPr sz="2400"/>
+              <a:defRPr sz="1074"/>
             </a:lvl3pPr>
             <a:lvl4pPr>
-              <a:defRPr sz="2000"/>
+              <a:defRPr sz="895"/>
             </a:lvl4pPr>
             <a:lvl5pPr>
-              <a:defRPr sz="2000"/>
+              <a:defRPr sz="895"/>
             </a:lvl5pPr>
             <a:lvl6pPr>
-              <a:defRPr sz="2000"/>
+              <a:defRPr sz="895"/>
             </a:lvl6pPr>
             <a:lvl7pPr>
-              <a:defRPr sz="2000"/>
+              <a:defRPr sz="895"/>
             </a:lvl7pPr>
             <a:lvl8pPr>
-              <a:defRPr sz="2000"/>
+              <a:defRPr sz="895"/>
             </a:lvl8pPr>
             <a:lvl9pPr>
-              <a:defRPr sz="2000"/>
+              <a:defRPr sz="895"/>
             </a:lvl9pPr>
           </a:lstStyle>
           <a:p>
@@ -2295,19 +2010,13 @@
               <a:rPr lang="en-GB"/>
               <a:t>Fifth level</a:t>
             </a:r>
-            <a:endParaRPr lang="en-US"/>
-          </a:p>
-        </p:txBody>
-      </p:sp>
-      <p:sp>
-        <p:nvSpPr>
-          <p:cNvPr id="4" name="Text Placeholder 3">
-            <a:extLst>
-              <a:ext uri="{FF2B5EF4-FFF2-40B4-BE49-F238E27FC236}">
-                <a16:creationId xmlns:a16="http://schemas.microsoft.com/office/drawing/2014/main" id="{6AC0237F-D03A-1E1E-E646-A4B1CDD389E1}"/>
-              </a:ext>
-            </a:extLst>
-          </p:cNvPr>
+            <a:endParaRPr lang="en-US" dirty="0"/>
+          </a:p>
+        </p:txBody>
+      </p:sp>
+      <p:sp>
+        <p:nvSpPr>
+          <p:cNvPr id="4" name="Text Placeholder 3"/>
           <p:cNvSpPr>
             <a:spLocks noGrp="1"/>
           </p:cNvSpPr>
@@ -2317,8 +2026,8 @@
         </p:nvSpPr>
         <p:spPr>
           <a:xfrm>
-            <a:off x="839788" y="2057400"/>
-            <a:ext cx="3932237" cy="3811588"/>
+            <a:off x="281898" y="1225868"/>
+            <a:ext cx="1319962" cy="2271071"/>
           </a:xfrm>
         </p:spPr>
         <p:txBody>
@@ -2326,39 +2035,39 @@
           <a:lstStyle>
             <a:lvl1pPr marL="0" indent="0">
               <a:buNone/>
-              <a:defRPr sz="1600"/>
+              <a:defRPr sz="716"/>
             </a:lvl1pPr>
-            <a:lvl2pPr marL="457200" indent="0">
-              <a:buNone/>
-              <a:defRPr sz="1400"/>
+            <a:lvl2pPr marL="204643" indent="0">
+              <a:buNone/>
+              <a:defRPr sz="627"/>
             </a:lvl2pPr>
-            <a:lvl3pPr marL="914400" indent="0">
-              <a:buNone/>
-              <a:defRPr sz="1200"/>
+            <a:lvl3pPr marL="409285" indent="0">
+              <a:buNone/>
+              <a:defRPr sz="537"/>
             </a:lvl3pPr>
-            <a:lvl4pPr marL="1371600" indent="0">
-              <a:buNone/>
-              <a:defRPr sz="1000"/>
+            <a:lvl4pPr marL="613928" indent="0">
+              <a:buNone/>
+              <a:defRPr sz="448"/>
             </a:lvl4pPr>
-            <a:lvl5pPr marL="1828800" indent="0">
-              <a:buNone/>
-              <a:defRPr sz="1000"/>
+            <a:lvl5pPr marL="818571" indent="0">
+              <a:buNone/>
+              <a:defRPr sz="448"/>
             </a:lvl5pPr>
-            <a:lvl6pPr marL="2286000" indent="0">
-              <a:buNone/>
-              <a:defRPr sz="1000"/>
+            <a:lvl6pPr marL="1023214" indent="0">
+              <a:buNone/>
+              <a:defRPr sz="448"/>
             </a:lvl6pPr>
-            <a:lvl7pPr marL="2743200" indent="0">
-              <a:buNone/>
-              <a:defRPr sz="1000"/>
+            <a:lvl7pPr marL="1227856" indent="0">
+              <a:buNone/>
+              <a:defRPr sz="448"/>
             </a:lvl7pPr>
-            <a:lvl8pPr marL="3200400" indent="0">
-              <a:buNone/>
-              <a:defRPr sz="1000"/>
+            <a:lvl8pPr marL="1432499" indent="0">
+              <a:buNone/>
+              <a:defRPr sz="448"/>
             </a:lvl8pPr>
-            <a:lvl9pPr marL="3657600" indent="0">
-              <a:buNone/>
-              <a:defRPr sz="1000"/>
+            <a:lvl9pPr marL="1637142" indent="0">
+              <a:buNone/>
+              <a:defRPr sz="448"/>
             </a:lvl9pPr>
           </a:lstStyle>
           <a:p>
@@ -2372,13 +2081,7 @@
       </p:sp>
       <p:sp>
         <p:nvSpPr>
-          <p:cNvPr id="5" name="Date Placeholder 4">
-            <a:extLst>
-              <a:ext uri="{FF2B5EF4-FFF2-40B4-BE49-F238E27FC236}">
-                <a16:creationId xmlns:a16="http://schemas.microsoft.com/office/drawing/2014/main" id="{8B1A0EC6-9A3F-E152-80CB-A5CF5F027450}"/>
-              </a:ext>
-            </a:extLst>
-          </p:cNvPr>
+          <p:cNvPr id="5" name="Date Placeholder 4"/>
           <p:cNvSpPr>
             <a:spLocks noGrp="1"/>
           </p:cNvSpPr>
@@ -2393,7 +2096,7 @@
           <a:p>
             <a:fld id="{3F4ECB22-EC8D-AE46-A7E6-96BE5F73D66D}" type="datetimeFigureOut">
               <a:rPr lang="en-US" smtClean="0"/>
-              <a:t>2/11/24</a:t>
+              <a:t>2/19/24</a:t>
             </a:fld>
             <a:endParaRPr lang="en-US"/>
           </a:p>
@@ -2401,13 +2104,7 @@
       </p:sp>
       <p:sp>
         <p:nvSpPr>
-          <p:cNvPr id="6" name="Footer Placeholder 5">
-            <a:extLst>
-              <a:ext uri="{FF2B5EF4-FFF2-40B4-BE49-F238E27FC236}">
-                <a16:creationId xmlns:a16="http://schemas.microsoft.com/office/drawing/2014/main" id="{17BFA37A-8390-9D89-9B69-A0E5E6CE2DD2}"/>
-              </a:ext>
-            </a:extLst>
-          </p:cNvPr>
+          <p:cNvPr id="6" name="Footer Placeholder 5"/>
           <p:cNvSpPr>
             <a:spLocks noGrp="1"/>
           </p:cNvSpPr>
@@ -2426,13 +2123,7 @@
       </p:sp>
       <p:sp>
         <p:nvSpPr>
-          <p:cNvPr id="7" name="Slide Number Placeholder 6">
-            <a:extLst>
-              <a:ext uri="{FF2B5EF4-FFF2-40B4-BE49-F238E27FC236}">
-                <a16:creationId xmlns:a16="http://schemas.microsoft.com/office/drawing/2014/main" id="{5F463D2E-15CD-18C3-F5B2-A4B0E7945D2D}"/>
-              </a:ext>
-            </a:extLst>
-          </p:cNvPr>
+          <p:cNvPr id="7" name="Slide Number Placeholder 6"/>
           <p:cNvSpPr>
             <a:spLocks noGrp="1"/>
           </p:cNvSpPr>
@@ -2456,7 +2147,7 @@
     </p:spTree>
     <p:extLst>
       <p:ext uri="{BB962C8B-B14F-4D97-AF65-F5344CB8AC3E}">
-        <p14:creationId xmlns:p14="http://schemas.microsoft.com/office/powerpoint/2010/main" val="1445126598"/>
+        <p14:creationId xmlns:p14="http://schemas.microsoft.com/office/powerpoint/2010/main" val="2275106657"/>
       </p:ext>
     </p:extLst>
   </p:cSld>
@@ -2485,13 +2176,7 @@
       </p:grpSpPr>
       <p:sp>
         <p:nvSpPr>
-          <p:cNvPr id="2" name="Title 1">
-            <a:extLst>
-              <a:ext uri="{FF2B5EF4-FFF2-40B4-BE49-F238E27FC236}">
-                <a16:creationId xmlns:a16="http://schemas.microsoft.com/office/drawing/2014/main" id="{FD594D59-74D5-F4AE-0862-901CE73BAB6E}"/>
-              </a:ext>
-            </a:extLst>
-          </p:cNvPr>
+          <p:cNvPr id="2" name="Title 1"/>
           <p:cNvSpPr>
             <a:spLocks noGrp="1"/>
           </p:cNvSpPr>
@@ -2501,15 +2186,15 @@
         </p:nvSpPr>
         <p:spPr>
           <a:xfrm>
-            <a:off x="839788" y="457200"/>
-            <a:ext cx="3932237" cy="1600200"/>
+            <a:off x="281898" y="272415"/>
+            <a:ext cx="1319962" cy="953453"/>
           </a:xfrm>
         </p:spPr>
         <p:txBody>
           <a:bodyPr anchor="b"/>
           <a:lstStyle>
             <a:lvl1pPr>
-              <a:defRPr sz="3200"/>
+              <a:defRPr sz="1432"/>
             </a:lvl1pPr>
           </a:lstStyle>
           <a:p>
@@ -2517,21 +2202,15 @@
               <a:rPr lang="en-GB"/>
               <a:t>Click to edit Master title style</a:t>
             </a:r>
-            <a:endParaRPr lang="en-US"/>
-          </a:p>
-        </p:txBody>
-      </p:sp>
-      <p:sp>
-        <p:nvSpPr>
-          <p:cNvPr id="3" name="Picture Placeholder 2">
-            <a:extLst>
-              <a:ext uri="{FF2B5EF4-FFF2-40B4-BE49-F238E27FC236}">
-                <a16:creationId xmlns:a16="http://schemas.microsoft.com/office/drawing/2014/main" id="{E6BC02C5-A04C-2895-C8C9-C38276B992DE}"/>
-              </a:ext>
-            </a:extLst>
-          </p:cNvPr>
-          <p:cNvSpPr>
-            <a:spLocks noGrp="1"/>
+            <a:endParaRPr lang="en-US" dirty="0"/>
+          </a:p>
+        </p:txBody>
+      </p:sp>
+      <p:sp>
+        <p:nvSpPr>
+          <p:cNvPr id="3" name="Picture Placeholder 2"/>
+          <p:cNvSpPr>
+            <a:spLocks noGrp="1" noChangeAspect="1"/>
           </p:cNvSpPr>
           <p:nvPr>
             <p:ph type="pic" idx="1"/>
@@ -2539,64 +2218,62 @@
         </p:nvSpPr>
         <p:spPr>
           <a:xfrm>
-            <a:off x="5183188" y="987425"/>
-            <a:ext cx="6172200" cy="4873625"/>
+            <a:off x="1739877" y="588342"/>
+            <a:ext cx="2071866" cy="2903868"/>
           </a:xfrm>
         </p:spPr>
         <p:txBody>
-          <a:bodyPr/>
+          <a:bodyPr anchor="t"/>
           <a:lstStyle>
             <a:lvl1pPr marL="0" indent="0">
               <a:buNone/>
-              <a:defRPr sz="3200"/>
+              <a:defRPr sz="1432"/>
             </a:lvl1pPr>
-            <a:lvl2pPr marL="457200" indent="0">
-              <a:buNone/>
-              <a:defRPr sz="2800"/>
+            <a:lvl2pPr marL="204643" indent="0">
+              <a:buNone/>
+              <a:defRPr sz="1253"/>
             </a:lvl2pPr>
-            <a:lvl3pPr marL="914400" indent="0">
-              <a:buNone/>
-              <a:defRPr sz="2400"/>
+            <a:lvl3pPr marL="409285" indent="0">
+              <a:buNone/>
+              <a:defRPr sz="1074"/>
             </a:lvl3pPr>
-            <a:lvl4pPr marL="1371600" indent="0">
-              <a:buNone/>
-              <a:defRPr sz="2000"/>
+            <a:lvl4pPr marL="613928" indent="0">
+              <a:buNone/>
+              <a:defRPr sz="895"/>
             </a:lvl4pPr>
-            <a:lvl5pPr marL="1828800" indent="0">
-              <a:buNone/>
-              <a:defRPr sz="2000"/>
+            <a:lvl5pPr marL="818571" indent="0">
+              <a:buNone/>
+              <a:defRPr sz="895"/>
             </a:lvl5pPr>
-            <a:lvl6pPr marL="2286000" indent="0">
-              <a:buNone/>
-              <a:defRPr sz="2000"/>
+            <a:lvl6pPr marL="1023214" indent="0">
+              <a:buNone/>
+              <a:defRPr sz="895"/>
             </a:lvl6pPr>
-            <a:lvl7pPr marL="2743200" indent="0">
-              <a:buNone/>
-              <a:defRPr sz="2000"/>
+            <a:lvl7pPr marL="1227856" indent="0">
+              <a:buNone/>
+              <a:defRPr sz="895"/>
             </a:lvl7pPr>
-            <a:lvl8pPr marL="3200400" indent="0">
-              <a:buNone/>
-              <a:defRPr sz="2000"/>
+            <a:lvl8pPr marL="1432499" indent="0">
+              <a:buNone/>
+              <a:defRPr sz="895"/>
             </a:lvl8pPr>
-            <a:lvl9pPr marL="3657600" indent="0">
-              <a:buNone/>
-              <a:defRPr sz="2000"/>
+            <a:lvl9pPr marL="1637142" indent="0">
+              <a:buNone/>
+              <a:defRPr sz="895"/>
             </a:lvl9pPr>
           </a:lstStyle>
           <a:p>
-            <a:endParaRPr lang="en-US"/>
-          </a:p>
-        </p:txBody>
-      </p:sp>
-      <p:sp>
-        <p:nvSpPr>
-          <p:cNvPr id="4" name="Text Placeholder 3">
-            <a:extLst>
-              <a:ext uri="{FF2B5EF4-FFF2-40B4-BE49-F238E27FC236}">
-                <a16:creationId xmlns:a16="http://schemas.microsoft.com/office/drawing/2014/main" id="{13FC2956-C5C9-490B-FB36-229005261051}"/>
-              </a:ext>
-            </a:extLst>
-          </p:cNvPr>
+            <a:r>
+              <a:rPr lang="en-GB"/>
+              <a:t>Click icon to add picture</a:t>
+            </a:r>
+            <a:endParaRPr lang="en-US" dirty="0"/>
+          </a:p>
+        </p:txBody>
+      </p:sp>
+      <p:sp>
+        <p:nvSpPr>
+          <p:cNvPr id="4" name="Text Placeholder 3"/>
           <p:cNvSpPr>
             <a:spLocks noGrp="1"/>
           </p:cNvSpPr>
@@ -2606,8 +2283,8 @@
         </p:nvSpPr>
         <p:spPr>
           <a:xfrm>
-            <a:off x="839788" y="2057400"/>
-            <a:ext cx="3932237" cy="3811588"/>
+            <a:off x="281898" y="1225868"/>
+            <a:ext cx="1319962" cy="2271071"/>
           </a:xfrm>
         </p:spPr>
         <p:txBody>
@@ -2615,39 +2292,39 @@
           <a:lstStyle>
             <a:lvl1pPr marL="0" indent="0">
               <a:buNone/>
-              <a:defRPr sz="1600"/>
+              <a:defRPr sz="716"/>
             </a:lvl1pPr>
-            <a:lvl2pPr marL="457200" indent="0">
-              <a:buNone/>
-              <a:defRPr sz="1400"/>
+            <a:lvl2pPr marL="204643" indent="0">
+              <a:buNone/>
+              <a:defRPr sz="627"/>
             </a:lvl2pPr>
-            <a:lvl3pPr marL="914400" indent="0">
-              <a:buNone/>
-              <a:defRPr sz="1200"/>
+            <a:lvl3pPr marL="409285" indent="0">
+              <a:buNone/>
+              <a:defRPr sz="537"/>
             </a:lvl3pPr>
-            <a:lvl4pPr marL="1371600" indent="0">
-              <a:buNone/>
-              <a:defRPr sz="1000"/>
+            <a:lvl4pPr marL="613928" indent="0">
+              <a:buNone/>
+              <a:defRPr sz="448"/>
             </a:lvl4pPr>
-            <a:lvl5pPr marL="1828800" indent="0">
-              <a:buNone/>
-              <a:defRPr sz="1000"/>
+            <a:lvl5pPr marL="818571" indent="0">
+              <a:buNone/>
+              <a:defRPr sz="448"/>
             </a:lvl5pPr>
-            <a:lvl6pPr marL="2286000" indent="0">
-              <a:buNone/>
-              <a:defRPr sz="1000"/>
+            <a:lvl6pPr marL="1023214" indent="0">
+              <a:buNone/>
+              <a:defRPr sz="448"/>
             </a:lvl6pPr>
-            <a:lvl7pPr marL="2743200" indent="0">
-              <a:buNone/>
-              <a:defRPr sz="1000"/>
+            <a:lvl7pPr marL="1227856" indent="0">
+              <a:buNone/>
+              <a:defRPr sz="448"/>
             </a:lvl7pPr>
-            <a:lvl8pPr marL="3200400" indent="0">
-              <a:buNone/>
-              <a:defRPr sz="1000"/>
+            <a:lvl8pPr marL="1432499" indent="0">
+              <a:buNone/>
+              <a:defRPr sz="448"/>
             </a:lvl8pPr>
-            <a:lvl9pPr marL="3657600" indent="0">
-              <a:buNone/>
-              <a:defRPr sz="1000"/>
+            <a:lvl9pPr marL="1637142" indent="0">
+              <a:buNone/>
+              <a:defRPr sz="448"/>
             </a:lvl9pPr>
           </a:lstStyle>
           <a:p>
@@ -2661,13 +2338,7 @@
       </p:sp>
       <p:sp>
         <p:nvSpPr>
-          <p:cNvPr id="5" name="Date Placeholder 4">
-            <a:extLst>
-              <a:ext uri="{FF2B5EF4-FFF2-40B4-BE49-F238E27FC236}">
-                <a16:creationId xmlns:a16="http://schemas.microsoft.com/office/drawing/2014/main" id="{C7A0D332-6848-9521-3CC6-A983F00F91A5}"/>
-              </a:ext>
-            </a:extLst>
-          </p:cNvPr>
+          <p:cNvPr id="5" name="Date Placeholder 4"/>
           <p:cNvSpPr>
             <a:spLocks noGrp="1"/>
           </p:cNvSpPr>
@@ -2682,7 +2353,7 @@
           <a:p>
             <a:fld id="{3F4ECB22-EC8D-AE46-A7E6-96BE5F73D66D}" type="datetimeFigureOut">
               <a:rPr lang="en-US" smtClean="0"/>
-              <a:t>2/11/24</a:t>
+              <a:t>2/19/24</a:t>
             </a:fld>
             <a:endParaRPr lang="en-US"/>
           </a:p>
@@ -2690,13 +2361,7 @@
       </p:sp>
       <p:sp>
         <p:nvSpPr>
-          <p:cNvPr id="6" name="Footer Placeholder 5">
-            <a:extLst>
-              <a:ext uri="{FF2B5EF4-FFF2-40B4-BE49-F238E27FC236}">
-                <a16:creationId xmlns:a16="http://schemas.microsoft.com/office/drawing/2014/main" id="{8BC156E4-8C2E-9C9C-B8D3-1D59E4D28012}"/>
-              </a:ext>
-            </a:extLst>
-          </p:cNvPr>
+          <p:cNvPr id="6" name="Footer Placeholder 5"/>
           <p:cNvSpPr>
             <a:spLocks noGrp="1"/>
           </p:cNvSpPr>
@@ -2715,13 +2380,7 @@
       </p:sp>
       <p:sp>
         <p:nvSpPr>
-          <p:cNvPr id="7" name="Slide Number Placeholder 6">
-            <a:extLst>
-              <a:ext uri="{FF2B5EF4-FFF2-40B4-BE49-F238E27FC236}">
-                <a16:creationId xmlns:a16="http://schemas.microsoft.com/office/drawing/2014/main" id="{57322DBD-930E-2A56-36D3-1640EAFD24F1}"/>
-              </a:ext>
-            </a:extLst>
-          </p:cNvPr>
+          <p:cNvPr id="7" name="Slide Number Placeholder 6"/>
           <p:cNvSpPr>
             <a:spLocks noGrp="1"/>
           </p:cNvSpPr>
@@ -2745,7 +2404,7 @@
     </p:spTree>
     <p:extLst>
       <p:ext uri="{BB962C8B-B14F-4D97-AF65-F5344CB8AC3E}">
-        <p14:creationId xmlns:p14="http://schemas.microsoft.com/office/powerpoint/2010/main" val="1551853398"/>
+        <p14:creationId xmlns:p14="http://schemas.microsoft.com/office/powerpoint/2010/main" val="1406273944"/>
       </p:ext>
     </p:extLst>
   </p:cSld>
@@ -2779,13 +2438,7 @@
       </p:grpSpPr>
       <p:sp>
         <p:nvSpPr>
-          <p:cNvPr id="2" name="Title Placeholder 1">
-            <a:extLst>
-              <a:ext uri="{FF2B5EF4-FFF2-40B4-BE49-F238E27FC236}">
-                <a16:creationId xmlns:a16="http://schemas.microsoft.com/office/drawing/2014/main" id="{83305B57-3277-22BC-1B8F-D538336815ED}"/>
-              </a:ext>
-            </a:extLst>
-          </p:cNvPr>
+          <p:cNvPr id="2" name="Title Placeholder 1"/>
           <p:cNvSpPr>
             <a:spLocks noGrp="1"/>
           </p:cNvSpPr>
@@ -2795,8 +2448,8 @@
         </p:nvSpPr>
         <p:spPr>
           <a:xfrm>
-            <a:off x="838200" y="365125"/>
-            <a:ext cx="10515600" cy="1325563"/>
+            <a:off x="281365" y="217554"/>
+            <a:ext cx="3529846" cy="789815"/>
           </a:xfrm>
           <a:prstGeom prst="rect">
             <a:avLst/>
@@ -2812,19 +2465,13 @@
               <a:rPr lang="en-GB"/>
               <a:t>Click to edit Master title style</a:t>
             </a:r>
-            <a:endParaRPr lang="en-US"/>
-          </a:p>
-        </p:txBody>
-      </p:sp>
-      <p:sp>
-        <p:nvSpPr>
-          <p:cNvPr id="3" name="Text Placeholder 2">
-            <a:extLst>
-              <a:ext uri="{FF2B5EF4-FFF2-40B4-BE49-F238E27FC236}">
-                <a16:creationId xmlns:a16="http://schemas.microsoft.com/office/drawing/2014/main" id="{B8263FB3-6DAD-61F7-45A3-CEB3AD528C38}"/>
-              </a:ext>
-            </a:extLst>
-          </p:cNvPr>
+            <a:endParaRPr lang="en-US" dirty="0"/>
+          </a:p>
+        </p:txBody>
+      </p:sp>
+      <p:sp>
+        <p:nvSpPr>
+          <p:cNvPr id="3" name="Text Placeholder 2"/>
           <p:cNvSpPr>
             <a:spLocks noGrp="1"/>
           </p:cNvSpPr>
@@ -2834,8 +2481,8 @@
         </p:nvSpPr>
         <p:spPr>
           <a:xfrm>
-            <a:off x="838200" y="1825625"/>
-            <a:ext cx="10515600" cy="4351338"/>
+            <a:off x="281365" y="1087768"/>
+            <a:ext cx="3529846" cy="2592672"/>
           </a:xfrm>
           <a:prstGeom prst="rect">
             <a:avLst/>
@@ -2880,19 +2527,13 @@
               <a:rPr lang="en-GB"/>
               <a:t>Fifth level</a:t>
             </a:r>
-            <a:endParaRPr lang="en-US"/>
-          </a:p>
-        </p:txBody>
-      </p:sp>
-      <p:sp>
-        <p:nvSpPr>
-          <p:cNvPr id="4" name="Date Placeholder 3">
-            <a:extLst>
-              <a:ext uri="{FF2B5EF4-FFF2-40B4-BE49-F238E27FC236}">
-                <a16:creationId xmlns:a16="http://schemas.microsoft.com/office/drawing/2014/main" id="{9441A86F-D35C-7124-E324-DC63009CFDB8}"/>
-              </a:ext>
-            </a:extLst>
-          </p:cNvPr>
+            <a:endParaRPr lang="en-US" dirty="0"/>
+          </a:p>
+        </p:txBody>
+      </p:sp>
+      <p:sp>
+        <p:nvSpPr>
+          <p:cNvPr id="4" name="Date Placeholder 3"/>
           <p:cNvSpPr>
             <a:spLocks noGrp="1"/>
           </p:cNvSpPr>
@@ -2902,8 +2543,8 @@
         </p:nvSpPr>
         <p:spPr>
           <a:xfrm>
-            <a:off x="838200" y="6356350"/>
-            <a:ext cx="2743200" cy="365125"/>
+            <a:off x="281365" y="3787326"/>
+            <a:ext cx="920829" cy="217554"/>
           </a:xfrm>
           <a:prstGeom prst="rect">
             <a:avLst/>
@@ -2913,7 +2554,7 @@
           <a:bodyPr vert="horz" lIns="91440" tIns="45720" rIns="91440" bIns="45720" rtlCol="0" anchor="ctr"/>
           <a:lstStyle>
             <a:lvl1pPr algn="l">
-              <a:defRPr sz="1200">
+              <a:defRPr sz="537">
                 <a:solidFill>
                   <a:schemeClr val="tx1">
                     <a:tint val="75000"/>
@@ -2925,7 +2566,7 @@
           <a:p>
             <a:fld id="{3F4ECB22-EC8D-AE46-A7E6-96BE5F73D66D}" type="datetimeFigureOut">
               <a:rPr lang="en-US" smtClean="0"/>
-              <a:t>2/11/24</a:t>
+              <a:t>2/19/24</a:t>
             </a:fld>
             <a:endParaRPr lang="en-US"/>
           </a:p>
@@ -2933,13 +2574,7 @@
       </p:sp>
       <p:sp>
         <p:nvSpPr>
-          <p:cNvPr id="5" name="Footer Placeholder 4">
-            <a:extLst>
-              <a:ext uri="{FF2B5EF4-FFF2-40B4-BE49-F238E27FC236}">
-                <a16:creationId xmlns:a16="http://schemas.microsoft.com/office/drawing/2014/main" id="{0E0CE511-0546-4028-36BA-44DB32DDC740}"/>
-              </a:ext>
-            </a:extLst>
-          </p:cNvPr>
+          <p:cNvPr id="5" name="Footer Placeholder 4"/>
           <p:cNvSpPr>
             <a:spLocks noGrp="1"/>
           </p:cNvSpPr>
@@ -2949,8 +2584,8 @@
         </p:nvSpPr>
         <p:spPr>
           <a:xfrm>
-            <a:off x="4038600" y="6356350"/>
-            <a:ext cx="4114800" cy="365125"/>
+            <a:off x="1355666" y="3787326"/>
+            <a:ext cx="1381244" cy="217554"/>
           </a:xfrm>
           <a:prstGeom prst="rect">
             <a:avLst/>
@@ -2960,7 +2595,7 @@
           <a:bodyPr vert="horz" lIns="91440" tIns="45720" rIns="91440" bIns="45720" rtlCol="0" anchor="ctr"/>
           <a:lstStyle>
             <a:lvl1pPr algn="ctr">
-              <a:defRPr sz="1200">
+              <a:defRPr sz="537">
                 <a:solidFill>
                   <a:schemeClr val="tx1">
                     <a:tint val="75000"/>
@@ -2976,13 +2611,7 @@
       </p:sp>
       <p:sp>
         <p:nvSpPr>
-          <p:cNvPr id="6" name="Slide Number Placeholder 5">
-            <a:extLst>
-              <a:ext uri="{FF2B5EF4-FFF2-40B4-BE49-F238E27FC236}">
-                <a16:creationId xmlns:a16="http://schemas.microsoft.com/office/drawing/2014/main" id="{2D1D7A84-6F93-AF0E-67A7-33DF55C16F54}"/>
-              </a:ext>
-            </a:extLst>
-          </p:cNvPr>
+          <p:cNvPr id="6" name="Slide Number Placeholder 5"/>
           <p:cNvSpPr>
             <a:spLocks noGrp="1"/>
           </p:cNvSpPr>
@@ -2992,8 +2621,8 @@
         </p:nvSpPr>
         <p:spPr>
           <a:xfrm>
-            <a:off x="8610600" y="6356350"/>
-            <a:ext cx="2743200" cy="365125"/>
+            <a:off x="2890381" y="3787326"/>
+            <a:ext cx="920829" cy="217554"/>
           </a:xfrm>
           <a:prstGeom prst="rect">
             <a:avLst/>
@@ -3003,7 +2632,7 @@
           <a:bodyPr vert="horz" lIns="91440" tIns="45720" rIns="91440" bIns="45720" rtlCol="0" anchor="ctr"/>
           <a:lstStyle>
             <a:lvl1pPr algn="r">
-              <a:defRPr sz="1200">
+              <a:defRPr sz="537">
                 <a:solidFill>
                   <a:schemeClr val="tx1">
                     <a:tint val="75000"/>
@@ -3024,27 +2653,27 @@
     </p:spTree>
     <p:extLst>
       <p:ext uri="{BB962C8B-B14F-4D97-AF65-F5344CB8AC3E}">
-        <p14:creationId xmlns:p14="http://schemas.microsoft.com/office/powerpoint/2010/main" val="83315067"/>
+        <p14:creationId xmlns:p14="http://schemas.microsoft.com/office/powerpoint/2010/main" val="962449477"/>
       </p:ext>
     </p:extLst>
   </p:cSld>
   <p:clrMap bg1="lt1" tx1="dk1" bg2="lt2" tx2="dk2" accent1="accent1" accent2="accent2" accent3="accent3" accent4="accent4" accent5="accent5" accent6="accent6" hlink="hlink" folHlink="folHlink"/>
   <p:sldLayoutIdLst>
-    <p:sldLayoutId id="2147483649" r:id="rId1"/>
-    <p:sldLayoutId id="2147483650" r:id="rId2"/>
-    <p:sldLayoutId id="2147483651" r:id="rId3"/>
-    <p:sldLayoutId id="2147483652" r:id="rId4"/>
-    <p:sldLayoutId id="2147483653" r:id="rId5"/>
-    <p:sldLayoutId id="2147483654" r:id="rId6"/>
-    <p:sldLayoutId id="2147483655" r:id="rId7"/>
-    <p:sldLayoutId id="2147483656" r:id="rId8"/>
-    <p:sldLayoutId id="2147483657" r:id="rId9"/>
-    <p:sldLayoutId id="2147483658" r:id="rId10"/>
-    <p:sldLayoutId id="2147483659" r:id="rId11"/>
+    <p:sldLayoutId id="2147483709" r:id="rId1"/>
+    <p:sldLayoutId id="2147483710" r:id="rId2"/>
+    <p:sldLayoutId id="2147483711" r:id="rId3"/>
+    <p:sldLayoutId id="2147483712" r:id="rId4"/>
+    <p:sldLayoutId id="2147483713" r:id="rId5"/>
+    <p:sldLayoutId id="2147483714" r:id="rId6"/>
+    <p:sldLayoutId id="2147483715" r:id="rId7"/>
+    <p:sldLayoutId id="2147483716" r:id="rId8"/>
+    <p:sldLayoutId id="2147483717" r:id="rId9"/>
+    <p:sldLayoutId id="2147483718" r:id="rId10"/>
+    <p:sldLayoutId id="2147483719" r:id="rId11"/>
   </p:sldLayoutIdLst>
   <p:txStyles>
     <p:titleStyle>
-      <a:lvl1pPr algn="l" defTabSz="914400" rtl="0" eaLnBrk="1" latinLnBrk="0" hangingPunct="1">
+      <a:lvl1pPr algn="l" defTabSz="409285" rtl="0" eaLnBrk="1" latinLnBrk="0" hangingPunct="1">
         <a:lnSpc>
           <a:spcPct val="90000"/>
         </a:lnSpc>
@@ -3052,7 +2681,7 @@
           <a:spcPct val="0"/>
         </a:spcBef>
         <a:buNone/>
-        <a:defRPr sz="4400" kern="1200">
+        <a:defRPr sz="1969" kern="1200">
           <a:solidFill>
             <a:schemeClr val="tx1"/>
           </a:solidFill>
@@ -3063,16 +2692,16 @@
       </a:lvl1pPr>
     </p:titleStyle>
     <p:bodyStyle>
-      <a:lvl1pPr marL="228600" indent="-228600" algn="l" defTabSz="914400" rtl="0" eaLnBrk="1" latinLnBrk="0" hangingPunct="1">
+      <a:lvl1pPr marL="102321" indent="-102321" algn="l" defTabSz="409285" rtl="0" eaLnBrk="1" latinLnBrk="0" hangingPunct="1">
         <a:lnSpc>
           <a:spcPct val="90000"/>
         </a:lnSpc>
         <a:spcBef>
-          <a:spcPts val="1000"/>
+          <a:spcPts val="448"/>
         </a:spcBef>
         <a:buFont typeface="Arial" panose="020B0604020202020204" pitchFamily="34" charset="0"/>
         <a:buChar char="•"/>
-        <a:defRPr sz="2800" kern="1200">
+        <a:defRPr sz="1253" kern="1200">
           <a:solidFill>
             <a:schemeClr val="tx1"/>
           </a:solidFill>
@@ -3081,16 +2710,16 @@
           <a:cs typeface="+mn-cs"/>
         </a:defRPr>
       </a:lvl1pPr>
-      <a:lvl2pPr marL="685800" indent="-228600" algn="l" defTabSz="914400" rtl="0" eaLnBrk="1" latinLnBrk="0" hangingPunct="1">
+      <a:lvl2pPr marL="306964" indent="-102321" algn="l" defTabSz="409285" rtl="0" eaLnBrk="1" latinLnBrk="0" hangingPunct="1">
         <a:lnSpc>
           <a:spcPct val="90000"/>
         </a:lnSpc>
         <a:spcBef>
-          <a:spcPts val="500"/>
+          <a:spcPts val="224"/>
         </a:spcBef>
         <a:buFont typeface="Arial" panose="020B0604020202020204" pitchFamily="34" charset="0"/>
         <a:buChar char="•"/>
-        <a:defRPr sz="2400" kern="1200">
+        <a:defRPr sz="1074" kern="1200">
           <a:solidFill>
             <a:schemeClr val="tx1"/>
           </a:solidFill>
@@ -3099,16 +2728,16 @@
           <a:cs typeface="+mn-cs"/>
         </a:defRPr>
       </a:lvl2pPr>
-      <a:lvl3pPr marL="1143000" indent="-228600" algn="l" defTabSz="914400" rtl="0" eaLnBrk="1" latinLnBrk="0" hangingPunct="1">
+      <a:lvl3pPr marL="511607" indent="-102321" algn="l" defTabSz="409285" rtl="0" eaLnBrk="1" latinLnBrk="0" hangingPunct="1">
         <a:lnSpc>
           <a:spcPct val="90000"/>
         </a:lnSpc>
         <a:spcBef>
-          <a:spcPts val="500"/>
+          <a:spcPts val="224"/>
         </a:spcBef>
         <a:buFont typeface="Arial" panose="020B0604020202020204" pitchFamily="34" charset="0"/>
         <a:buChar char="•"/>
-        <a:defRPr sz="2000" kern="1200">
+        <a:defRPr sz="895" kern="1200">
           <a:solidFill>
             <a:schemeClr val="tx1"/>
           </a:solidFill>
@@ -3117,16 +2746,16 @@
           <a:cs typeface="+mn-cs"/>
         </a:defRPr>
       </a:lvl3pPr>
-      <a:lvl4pPr marL="1600200" indent="-228600" algn="l" defTabSz="914400" rtl="0" eaLnBrk="1" latinLnBrk="0" hangingPunct="1">
+      <a:lvl4pPr marL="716250" indent="-102321" algn="l" defTabSz="409285" rtl="0" eaLnBrk="1" latinLnBrk="0" hangingPunct="1">
         <a:lnSpc>
           <a:spcPct val="90000"/>
         </a:lnSpc>
         <a:spcBef>
-          <a:spcPts val="500"/>
+          <a:spcPts val="224"/>
         </a:spcBef>
         <a:buFont typeface="Arial" panose="020B0604020202020204" pitchFamily="34" charset="0"/>
         <a:buChar char="•"/>
-        <a:defRPr sz="1800" kern="1200">
+        <a:defRPr sz="806" kern="1200">
           <a:solidFill>
             <a:schemeClr val="tx1"/>
           </a:solidFill>
@@ -3135,16 +2764,16 @@
           <a:cs typeface="+mn-cs"/>
         </a:defRPr>
       </a:lvl4pPr>
-      <a:lvl5pPr marL="2057400" indent="-228600" algn="l" defTabSz="914400" rtl="0" eaLnBrk="1" latinLnBrk="0" hangingPunct="1">
+      <a:lvl5pPr marL="920892" indent="-102321" algn="l" defTabSz="409285" rtl="0" eaLnBrk="1" latinLnBrk="0" hangingPunct="1">
         <a:lnSpc>
           <a:spcPct val="90000"/>
         </a:lnSpc>
         <a:spcBef>
-          <a:spcPts val="500"/>
+          <a:spcPts val="224"/>
         </a:spcBef>
         <a:buFont typeface="Arial" panose="020B0604020202020204" pitchFamily="34" charset="0"/>
         <a:buChar char="•"/>
-        <a:defRPr sz="1800" kern="1200">
+        <a:defRPr sz="806" kern="1200">
           <a:solidFill>
             <a:schemeClr val="tx1"/>
           </a:solidFill>
@@ -3153,16 +2782,16 @@
           <a:cs typeface="+mn-cs"/>
         </a:defRPr>
       </a:lvl5pPr>
-      <a:lvl6pPr marL="2514600" indent="-228600" algn="l" defTabSz="914400" rtl="0" eaLnBrk="1" latinLnBrk="0" hangingPunct="1">
+      <a:lvl6pPr marL="1125535" indent="-102321" algn="l" defTabSz="409285" rtl="0" eaLnBrk="1" latinLnBrk="0" hangingPunct="1">
         <a:lnSpc>
           <a:spcPct val="90000"/>
         </a:lnSpc>
         <a:spcBef>
-          <a:spcPts val="500"/>
+          <a:spcPts val="224"/>
         </a:spcBef>
         <a:buFont typeface="Arial" panose="020B0604020202020204" pitchFamily="34" charset="0"/>
         <a:buChar char="•"/>
-        <a:defRPr sz="1800" kern="1200">
+        <a:defRPr sz="806" kern="1200">
           <a:solidFill>
             <a:schemeClr val="tx1"/>
           </a:solidFill>
@@ -3171,16 +2800,16 @@
           <a:cs typeface="+mn-cs"/>
         </a:defRPr>
       </a:lvl6pPr>
-      <a:lvl7pPr marL="2971800" indent="-228600" algn="l" defTabSz="914400" rtl="0" eaLnBrk="1" latinLnBrk="0" hangingPunct="1">
+      <a:lvl7pPr marL="1330178" indent="-102321" algn="l" defTabSz="409285" rtl="0" eaLnBrk="1" latinLnBrk="0" hangingPunct="1">
         <a:lnSpc>
           <a:spcPct val="90000"/>
         </a:lnSpc>
         <a:spcBef>
-          <a:spcPts val="500"/>
+          <a:spcPts val="224"/>
         </a:spcBef>
         <a:buFont typeface="Arial" panose="020B0604020202020204" pitchFamily="34" charset="0"/>
         <a:buChar char="•"/>
-        <a:defRPr sz="1800" kern="1200">
+        <a:defRPr sz="806" kern="1200">
           <a:solidFill>
             <a:schemeClr val="tx1"/>
           </a:solidFill>
@@ -3189,16 +2818,16 @@
           <a:cs typeface="+mn-cs"/>
         </a:defRPr>
       </a:lvl7pPr>
-      <a:lvl8pPr marL="3429000" indent="-228600" algn="l" defTabSz="914400" rtl="0" eaLnBrk="1" latinLnBrk="0" hangingPunct="1">
+      <a:lvl8pPr marL="1534820" indent="-102321" algn="l" defTabSz="409285" rtl="0" eaLnBrk="1" latinLnBrk="0" hangingPunct="1">
         <a:lnSpc>
           <a:spcPct val="90000"/>
         </a:lnSpc>
         <a:spcBef>
-          <a:spcPts val="500"/>
+          <a:spcPts val="224"/>
         </a:spcBef>
         <a:buFont typeface="Arial" panose="020B0604020202020204" pitchFamily="34" charset="0"/>
         <a:buChar char="•"/>
-        <a:defRPr sz="1800" kern="1200">
+        <a:defRPr sz="806" kern="1200">
           <a:solidFill>
             <a:schemeClr val="tx1"/>
           </a:solidFill>
@@ -3207,16 +2836,16 @@
           <a:cs typeface="+mn-cs"/>
         </a:defRPr>
       </a:lvl8pPr>
-      <a:lvl9pPr marL="3886200" indent="-228600" algn="l" defTabSz="914400" rtl="0" eaLnBrk="1" latinLnBrk="0" hangingPunct="1">
+      <a:lvl9pPr marL="1739463" indent="-102321" algn="l" defTabSz="409285" rtl="0" eaLnBrk="1" latinLnBrk="0" hangingPunct="1">
         <a:lnSpc>
           <a:spcPct val="90000"/>
         </a:lnSpc>
         <a:spcBef>
-          <a:spcPts val="500"/>
+          <a:spcPts val="224"/>
         </a:spcBef>
         <a:buFont typeface="Arial" panose="020B0604020202020204" pitchFamily="34" charset="0"/>
         <a:buChar char="•"/>
-        <a:defRPr sz="1800" kern="1200">
+        <a:defRPr sz="806" kern="1200">
           <a:solidFill>
             <a:schemeClr val="tx1"/>
           </a:solidFill>
@@ -3230,8 +2859,8 @@
       <a:defPPr>
         <a:defRPr lang="en-US"/>
       </a:defPPr>
-      <a:lvl1pPr marL="0" algn="l" defTabSz="914400" rtl="0" eaLnBrk="1" latinLnBrk="0" hangingPunct="1">
-        <a:defRPr sz="1800" kern="1200">
+      <a:lvl1pPr marL="0" algn="l" defTabSz="409285" rtl="0" eaLnBrk="1" latinLnBrk="0" hangingPunct="1">
+        <a:defRPr sz="806" kern="1200">
           <a:solidFill>
             <a:schemeClr val="tx1"/>
           </a:solidFill>
@@ -3240,8 +2869,8 @@
           <a:cs typeface="+mn-cs"/>
         </a:defRPr>
       </a:lvl1pPr>
-      <a:lvl2pPr marL="457200" algn="l" defTabSz="914400" rtl="0" eaLnBrk="1" latinLnBrk="0" hangingPunct="1">
-        <a:defRPr sz="1800" kern="1200">
+      <a:lvl2pPr marL="204643" algn="l" defTabSz="409285" rtl="0" eaLnBrk="1" latinLnBrk="0" hangingPunct="1">
+        <a:defRPr sz="806" kern="1200">
           <a:solidFill>
             <a:schemeClr val="tx1"/>
           </a:solidFill>
@@ -3250,8 +2879,8 @@
           <a:cs typeface="+mn-cs"/>
         </a:defRPr>
       </a:lvl2pPr>
-      <a:lvl3pPr marL="914400" algn="l" defTabSz="914400" rtl="0" eaLnBrk="1" latinLnBrk="0" hangingPunct="1">
-        <a:defRPr sz="1800" kern="1200">
+      <a:lvl3pPr marL="409285" algn="l" defTabSz="409285" rtl="0" eaLnBrk="1" latinLnBrk="0" hangingPunct="1">
+        <a:defRPr sz="806" kern="1200">
           <a:solidFill>
             <a:schemeClr val="tx1"/>
           </a:solidFill>
@@ -3260,8 +2889,8 @@
           <a:cs typeface="+mn-cs"/>
         </a:defRPr>
       </a:lvl3pPr>
-      <a:lvl4pPr marL="1371600" algn="l" defTabSz="914400" rtl="0" eaLnBrk="1" latinLnBrk="0" hangingPunct="1">
-        <a:defRPr sz="1800" kern="1200">
+      <a:lvl4pPr marL="613928" algn="l" defTabSz="409285" rtl="0" eaLnBrk="1" latinLnBrk="0" hangingPunct="1">
+        <a:defRPr sz="806" kern="1200">
           <a:solidFill>
             <a:schemeClr val="tx1"/>
           </a:solidFill>
@@ -3270,8 +2899,8 @@
           <a:cs typeface="+mn-cs"/>
         </a:defRPr>
       </a:lvl4pPr>
-      <a:lvl5pPr marL="1828800" algn="l" defTabSz="914400" rtl="0" eaLnBrk="1" latinLnBrk="0" hangingPunct="1">
-        <a:defRPr sz="1800" kern="1200">
+      <a:lvl5pPr marL="818571" algn="l" defTabSz="409285" rtl="0" eaLnBrk="1" latinLnBrk="0" hangingPunct="1">
+        <a:defRPr sz="806" kern="1200">
           <a:solidFill>
             <a:schemeClr val="tx1"/>
           </a:solidFill>
@@ -3280,8 +2909,8 @@
           <a:cs typeface="+mn-cs"/>
         </a:defRPr>
       </a:lvl5pPr>
-      <a:lvl6pPr marL="2286000" algn="l" defTabSz="914400" rtl="0" eaLnBrk="1" latinLnBrk="0" hangingPunct="1">
-        <a:defRPr sz="1800" kern="1200">
+      <a:lvl6pPr marL="1023214" algn="l" defTabSz="409285" rtl="0" eaLnBrk="1" latinLnBrk="0" hangingPunct="1">
+        <a:defRPr sz="806" kern="1200">
           <a:solidFill>
             <a:schemeClr val="tx1"/>
           </a:solidFill>
@@ -3290,8 +2919,8 @@
           <a:cs typeface="+mn-cs"/>
         </a:defRPr>
       </a:lvl6pPr>
-      <a:lvl7pPr marL="2743200" algn="l" defTabSz="914400" rtl="0" eaLnBrk="1" latinLnBrk="0" hangingPunct="1">
-        <a:defRPr sz="1800" kern="1200">
+      <a:lvl7pPr marL="1227856" algn="l" defTabSz="409285" rtl="0" eaLnBrk="1" latinLnBrk="0" hangingPunct="1">
+        <a:defRPr sz="806" kern="1200">
           <a:solidFill>
             <a:schemeClr val="tx1"/>
           </a:solidFill>
@@ -3300,8 +2929,8 @@
           <a:cs typeface="+mn-cs"/>
         </a:defRPr>
       </a:lvl7pPr>
-      <a:lvl8pPr marL="3200400" algn="l" defTabSz="914400" rtl="0" eaLnBrk="1" latinLnBrk="0" hangingPunct="1">
-        <a:defRPr sz="1800" kern="1200">
+      <a:lvl8pPr marL="1432499" algn="l" defTabSz="409285" rtl="0" eaLnBrk="1" latinLnBrk="0" hangingPunct="1">
+        <a:defRPr sz="806" kern="1200">
           <a:solidFill>
             <a:schemeClr val="tx1"/>
           </a:solidFill>
@@ -3310,8 +2939,8 @@
           <a:cs typeface="+mn-cs"/>
         </a:defRPr>
       </a:lvl8pPr>
-      <a:lvl9pPr marL="3657600" algn="l" defTabSz="914400" rtl="0" eaLnBrk="1" latinLnBrk="0" hangingPunct="1">
-        <a:defRPr sz="1800" kern="1200">
+      <a:lvl9pPr marL="1637142" algn="l" defTabSz="409285" rtl="0" eaLnBrk="1" latinLnBrk="0" hangingPunct="1">
+        <a:defRPr sz="806" kern="1200">
           <a:solidFill>
             <a:schemeClr val="tx1"/>
           </a:solidFill>
@@ -3356,7 +2985,7 @@
         </p:nvSpPr>
         <p:spPr>
           <a:xfrm>
-            <a:off x="3903133" y="635001"/>
+            <a:off x="1373187" y="186112"/>
             <a:ext cx="1346200" cy="719667"/>
           </a:xfrm>
           <a:prstGeom prst="roundRect">
@@ -3412,7 +3041,7 @@
         </p:nvSpPr>
         <p:spPr>
           <a:xfrm>
-            <a:off x="3903133" y="1612900"/>
+            <a:off x="1373187" y="1164012"/>
             <a:ext cx="1346200" cy="719667"/>
           </a:xfrm>
           <a:prstGeom prst="roundRect">
@@ -3468,7 +3097,7 @@
         </p:nvSpPr>
         <p:spPr>
           <a:xfrm>
-            <a:off x="2556933" y="2590799"/>
+            <a:off x="26987" y="2141911"/>
             <a:ext cx="1346200" cy="719667"/>
           </a:xfrm>
           <a:prstGeom prst="roundRect">
@@ -3524,7 +3153,7 @@
         </p:nvSpPr>
         <p:spPr>
           <a:xfrm>
-            <a:off x="5249333" y="2590800"/>
+            <a:off x="2719387" y="2141912"/>
             <a:ext cx="1346200" cy="719667"/>
           </a:xfrm>
           <a:prstGeom prst="roundRect">
@@ -3573,7 +3202,7 @@
         </p:nvSpPr>
         <p:spPr>
           <a:xfrm>
-            <a:off x="3903133" y="3674534"/>
+            <a:off x="1373187" y="3225646"/>
             <a:ext cx="1346200" cy="719667"/>
           </a:xfrm>
           <a:prstGeom prst="roundRect">
@@ -3625,7 +3254,7 @@
         </p:nvCxnSpPr>
         <p:spPr>
           <a:xfrm>
-            <a:off x="4576233" y="1354668"/>
+            <a:off x="2046287" y="905775"/>
             <a:ext cx="0" cy="258232"/>
           </a:xfrm>
           <a:prstGeom prst="straightConnector1">
@@ -3667,7 +3296,7 @@
         </p:nvCxnSpPr>
         <p:spPr>
           <a:xfrm rot="10800000" flipV="1">
-            <a:off x="3230033" y="1972733"/>
+            <a:off x="700087" y="1523845"/>
             <a:ext cx="673100" cy="618065"/>
           </a:xfrm>
           <a:prstGeom prst="bentConnector2">
@@ -3709,7 +3338,7 @@
         </p:nvCxnSpPr>
         <p:spPr>
           <a:xfrm>
-            <a:off x="5249333" y="1972734"/>
+            <a:off x="2719387" y="1523841"/>
             <a:ext cx="673100" cy="618066"/>
           </a:xfrm>
           <a:prstGeom prst="bentConnector2">
@@ -3751,7 +3380,7 @@
         </p:nvCxnSpPr>
         <p:spPr>
           <a:xfrm rot="5400000">
-            <a:off x="5067300" y="2819400"/>
+            <a:off x="2537358" y="2370507"/>
             <a:ext cx="364067" cy="1346200"/>
           </a:xfrm>
           <a:prstGeom prst="bentConnector3">
@@ -3790,7 +3419,7 @@
         </p:nvSpPr>
         <p:spPr>
           <a:xfrm>
-            <a:off x="3085054" y="1612900"/>
+            <a:off x="555112" y="1164008"/>
             <a:ext cx="856325" cy="369332"/>
           </a:xfrm>
           <a:prstGeom prst="rect">
@@ -3825,7 +3454,7 @@
         </p:nvSpPr>
         <p:spPr>
           <a:xfrm>
-            <a:off x="5211088" y="1612900"/>
+            <a:off x="2681145" y="1164008"/>
             <a:ext cx="806311" cy="369332"/>
           </a:xfrm>
           <a:prstGeom prst="rect">
@@ -3862,7 +3491,7 @@
 <file path=ppt/theme/theme1.xml><?xml version="1.0" encoding="utf-8"?>
 <a:theme xmlns:a="http://schemas.openxmlformats.org/drawingml/2006/main" name="Office Theme">
   <a:themeElements>
-    <a:clrScheme name="Office">
+    <a:clrScheme name="Office Theme">
       <a:dk1>
         <a:sysClr val="windowText" lastClr="000000"/>
       </a:dk1>
@@ -3900,7 +3529,7 @@
         <a:srgbClr val="954F72"/>
       </a:folHlink>
     </a:clrScheme>
-    <a:fontScheme name="Office">
+    <a:fontScheme name="Office Theme">
       <a:majorFont>
         <a:latin typeface="Calibri Light" panose="020F0302020204030204"/>
         <a:ea typeface=""/>
@@ -3935,23 +3564,6 @@
         <a:font script="Viet" typeface="Times New Roman"/>
         <a:font script="Uigh" typeface="Microsoft Uighur"/>
         <a:font script="Geor" typeface="Sylfaen"/>
-        <a:font script="Armn" typeface="Arial"/>
-        <a:font script="Bugi" typeface="Leelawadee UI"/>
-        <a:font script="Bopo" typeface="Microsoft JhengHei"/>
-        <a:font script="Java" typeface="Javanese Text"/>
-        <a:font script="Lisu" typeface="Segoe UI"/>
-        <a:font script="Mymr" typeface="Myanmar Text"/>
-        <a:font script="Nkoo" typeface="Ebrima"/>
-        <a:font script="Olck" typeface="Nirmala UI"/>
-        <a:font script="Osma" typeface="Ebrima"/>
-        <a:font script="Phag" typeface="Phagspa"/>
-        <a:font script="Syrn" typeface="Estrangelo Edessa"/>
-        <a:font script="Syrj" typeface="Estrangelo Edessa"/>
-        <a:font script="Syre" typeface="Estrangelo Edessa"/>
-        <a:font script="Sora" typeface="Nirmala UI"/>
-        <a:font script="Tale" typeface="Microsoft Tai Le"/>
-        <a:font script="Talu" typeface="Microsoft New Tai Lue"/>
-        <a:font script="Tfng" typeface="Ebrima"/>
       </a:majorFont>
       <a:minorFont>
         <a:latin typeface="Calibri" panose="020F0502020204030204"/>
@@ -3987,26 +3599,9 @@
         <a:font script="Viet" typeface="Arial"/>
         <a:font script="Uigh" typeface="Microsoft Uighur"/>
         <a:font script="Geor" typeface="Sylfaen"/>
-        <a:font script="Armn" typeface="Arial"/>
-        <a:font script="Bugi" typeface="Leelawadee UI"/>
-        <a:font script="Bopo" typeface="Microsoft JhengHei"/>
-        <a:font script="Java" typeface="Javanese Text"/>
-        <a:font script="Lisu" typeface="Segoe UI"/>
-        <a:font script="Mymr" typeface="Myanmar Text"/>
-        <a:font script="Nkoo" typeface="Ebrima"/>
-        <a:font script="Olck" typeface="Nirmala UI"/>
-        <a:font script="Osma" typeface="Ebrima"/>
-        <a:font script="Phag" typeface="Phagspa"/>
-        <a:font script="Syrn" typeface="Estrangelo Edessa"/>
-        <a:font script="Syrj" typeface="Estrangelo Edessa"/>
-        <a:font script="Syre" typeface="Estrangelo Edessa"/>
-        <a:font script="Sora" typeface="Nirmala UI"/>
-        <a:font script="Tale" typeface="Microsoft Tai Le"/>
-        <a:font script="Talu" typeface="Microsoft New Tai Lue"/>
-        <a:font script="Tfng" typeface="Ebrima"/>
       </a:minorFont>
     </a:fontScheme>
-    <a:fmtScheme name="Office">
+    <a:fmtScheme name="Office Theme">
       <a:fillStyleLst>
         <a:solidFill>
           <a:schemeClr val="phClr"/>
@@ -4148,7 +3743,7 @@
   <a:extraClrSchemeLst/>
   <a:extLst>
     <a:ext uri="{05A4C25C-085E-4340-85A3-A5531E510DB2}">
-      <thm15:themeFamily xmlns:thm15="http://schemas.microsoft.com/office/thememl/2012/main" name="Office Theme" id="{62F939B6-93AF-4DB8-9C6B-D6C7DFDC589F}" vid="{4A3C46E8-61CC-4603-A589-7422A47A8E4A}"/>
+      <thm15:themeFamily xmlns:thm15="http://schemas.microsoft.com/office/thememl/2012/main" name="Office 2013 - 2022 Theme" id="{62F939B6-93AF-4DB8-9C6B-D6C7DFDC589F}" vid="{4A3C46E8-61CC-4603-A589-7422A47A8E4A}"/>
     </a:ext>
   </a:extLst>
 </a:theme>

</xml_diff>